<commit_message>
change plan about hardware
</commit_message>
<xml_diff>
--- a/plan-doc/Hask U 2017.pptx
+++ b/plan-doc/Hask U 2017.pptx
@@ -12,7 +12,8 @@
     <p:sldId id="260" r:id="rId6"/>
     <p:sldId id="261" r:id="rId7"/>
     <p:sldId id="262" r:id="rId8"/>
-    <p:sldId id="263" r:id="rId9"/>
+    <p:sldId id="264" r:id="rId9"/>
+    <p:sldId id="263" r:id="rId10"/>
   </p:sldIdLst>
   <p:sldSz cx="12192000" cy="6858000"/>
   <p:notesSz cx="6858000" cy="9144000"/>
@@ -979,7 +980,7 @@
           <a:p>
             <a:fld id="{650CC5AA-EA73-488E-8F5E-018E528CEF81}" type="datetime1">
               <a:rPr kumimoji="1" lang="ja-JP" altLang="en-US" smtClean="0"/>
-              <a:t>2017/6/24</a:t>
+              <a:t>2017/8/2</a:t>
             </a:fld>
             <a:endParaRPr kumimoji="1" lang="ja-JP" altLang="en-US"/>
           </a:p>
@@ -1270,7 +1271,7 @@
           <a:p>
             <a:fld id="{650CC5AA-EA73-488E-8F5E-018E528CEF81}" type="datetime1">
               <a:rPr kumimoji="1" lang="ja-JP" altLang="en-US" smtClean="0"/>
-              <a:t>2017/6/24</a:t>
+              <a:t>2017/8/2</a:t>
             </a:fld>
             <a:endParaRPr kumimoji="1" lang="ja-JP" altLang="en-US"/>
           </a:p>
@@ -1381,7 +1382,7 @@
           <a:p>
             <a:fld id="{1B9D5CA4-8D8F-4493-A582-7E2DC808772E}" type="datetime1">
               <a:rPr lang="ja-JP" altLang="en-US" smtClean="0"/>
-              <a:t>2017/6/24</a:t>
+              <a:t>2017/8/2</a:t>
             </a:fld>
             <a:endParaRPr lang="ja-JP" altLang="en-US"/>
           </a:p>
@@ -3288,7 +3289,7 @@
           <a:p>
             <a:fld id="{1B9D5CA4-8D8F-4493-A582-7E2DC808772E}" type="datetime1">
               <a:rPr lang="ja-JP" altLang="en-US" smtClean="0"/>
-              <a:t>2017/6/24</a:t>
+              <a:t>2017/8/2</a:t>
             </a:fld>
             <a:endParaRPr lang="ja-JP" altLang="en-US"/>
           </a:p>
@@ -3796,7 +3797,7 @@
           <p:cNvPr id="5122" name="Picture 2" descr="http://tn-skr4.smilevideo.jp/smile?i=30410611.L">
             <a:extLst>
               <a:ext uri="{FF2B5EF4-FFF2-40B4-BE49-F238E27FC236}">
-                <a16:creationId xmlns:a16="http://schemas.microsoft.com/office/drawing/2014/main" id="{711A5891-E05C-438C-9D94-61CCF452DA1F}"/>
+                <a16:creationId xmlns:a16="http://schemas.microsoft.com/office/drawing/2014/main" xmlns="" id="{711A5891-E05C-438C-9D94-61CCF452DA1F}"/>
               </a:ext>
             </a:extLst>
           </p:cNvPr>
@@ -3850,7 +3851,7 @@
           <p:cNvPr id="2" name="タイトル 1">
             <a:extLst>
               <a:ext uri="{FF2B5EF4-FFF2-40B4-BE49-F238E27FC236}">
-                <a16:creationId xmlns:a16="http://schemas.microsoft.com/office/drawing/2014/main" id="{A9EE67F1-57AB-4E11-8C2E-B4B263D65EBC}"/>
+                <a16:creationId xmlns:a16="http://schemas.microsoft.com/office/drawing/2014/main" xmlns="" id="{A9EE67F1-57AB-4E11-8C2E-B4B263D65EBC}"/>
               </a:ext>
             </a:extLst>
           </p:cNvPr>
@@ -3878,7 +3879,7 @@
           <p:cNvPr id="3" name="コンテンツ プレースホルダー 2">
             <a:extLst>
               <a:ext uri="{FF2B5EF4-FFF2-40B4-BE49-F238E27FC236}">
-                <a16:creationId xmlns:a16="http://schemas.microsoft.com/office/drawing/2014/main" id="{015CD280-CF35-4924-9072-51B18B6C83E9}"/>
+                <a16:creationId xmlns:a16="http://schemas.microsoft.com/office/drawing/2014/main" xmlns="" id="{015CD280-CF35-4924-9072-51B18B6C83E9}"/>
               </a:ext>
             </a:extLst>
           </p:cNvPr>
@@ -4001,7 +4002,7 @@
           <p:cNvPr id="4" name="スライド番号プレースホルダー 3">
             <a:extLst>
               <a:ext uri="{FF2B5EF4-FFF2-40B4-BE49-F238E27FC236}">
-                <a16:creationId xmlns:a16="http://schemas.microsoft.com/office/drawing/2014/main" id="{1D70C17E-94DA-4FB1-A167-FEE22D1EC962}"/>
+                <a16:creationId xmlns:a16="http://schemas.microsoft.com/office/drawing/2014/main" xmlns="" id="{1D70C17E-94DA-4FB1-A167-FEE22D1EC962}"/>
               </a:ext>
             </a:extLst>
           </p:cNvPr>
@@ -4031,7 +4032,7 @@
           <p:cNvPr id="5" name="テキスト ボックス 4">
             <a:extLst>
               <a:ext uri="{FF2B5EF4-FFF2-40B4-BE49-F238E27FC236}">
-                <a16:creationId xmlns:a16="http://schemas.microsoft.com/office/drawing/2014/main" id="{F1145B5D-97A8-4CDB-BDD4-3B8B4062D222}"/>
+                <a16:creationId xmlns:a16="http://schemas.microsoft.com/office/drawing/2014/main" xmlns="" id="{F1145B5D-97A8-4CDB-BDD4-3B8B4062D222}"/>
               </a:ext>
             </a:extLst>
           </p:cNvPr>
@@ -4100,7 +4101,7 @@
           <p:cNvPr id="2" name="タイトル 1">
             <a:extLst>
               <a:ext uri="{FF2B5EF4-FFF2-40B4-BE49-F238E27FC236}">
-                <a16:creationId xmlns:a16="http://schemas.microsoft.com/office/drawing/2014/main" id="{9319BBA4-BBCD-4CDA-BE71-A4EBFD4A7AEB}"/>
+                <a16:creationId xmlns:a16="http://schemas.microsoft.com/office/drawing/2014/main" xmlns="" id="{9319BBA4-BBCD-4CDA-BE71-A4EBFD4A7AEB}"/>
               </a:ext>
             </a:extLst>
           </p:cNvPr>
@@ -4128,7 +4129,7 @@
           <p:cNvPr id="3" name="コンテンツ プレースホルダー 2">
             <a:extLst>
               <a:ext uri="{FF2B5EF4-FFF2-40B4-BE49-F238E27FC236}">
-                <a16:creationId xmlns:a16="http://schemas.microsoft.com/office/drawing/2014/main" id="{F4430F36-3BAE-4AFC-82F8-BAD0E75ABC4E}"/>
+                <a16:creationId xmlns:a16="http://schemas.microsoft.com/office/drawing/2014/main" xmlns="" id="{F4430F36-3BAE-4AFC-82F8-BAD0E75ABC4E}"/>
               </a:ext>
             </a:extLst>
           </p:cNvPr>
@@ -4186,7 +4187,7 @@
           <p:cNvPr id="4" name="スライド番号プレースホルダー 3">
             <a:extLst>
               <a:ext uri="{FF2B5EF4-FFF2-40B4-BE49-F238E27FC236}">
-                <a16:creationId xmlns:a16="http://schemas.microsoft.com/office/drawing/2014/main" id="{0802EE7E-B92B-4D70-A8E0-93F1EF671EA8}"/>
+                <a16:creationId xmlns:a16="http://schemas.microsoft.com/office/drawing/2014/main" xmlns="" id="{0802EE7E-B92B-4D70-A8E0-93F1EF671EA8}"/>
               </a:ext>
             </a:extLst>
           </p:cNvPr>
@@ -4246,7 +4247,7 @@
           <p:cNvPr id="2" name="タイトル 1">
             <a:extLst>
               <a:ext uri="{FF2B5EF4-FFF2-40B4-BE49-F238E27FC236}">
-                <a16:creationId xmlns:a16="http://schemas.microsoft.com/office/drawing/2014/main" id="{4F86BA45-037F-4C49-A90B-61D0497D619E}"/>
+                <a16:creationId xmlns:a16="http://schemas.microsoft.com/office/drawing/2014/main" xmlns="" id="{4F86BA45-037F-4C49-A90B-61D0497D619E}"/>
               </a:ext>
             </a:extLst>
           </p:cNvPr>
@@ -4274,7 +4275,7 @@
           <p:cNvPr id="4" name="スライド番号プレースホルダー 3">
             <a:extLst>
               <a:ext uri="{FF2B5EF4-FFF2-40B4-BE49-F238E27FC236}">
-                <a16:creationId xmlns:a16="http://schemas.microsoft.com/office/drawing/2014/main" id="{C1740923-F10F-411A-BDD6-16C4C38C554F}"/>
+                <a16:creationId xmlns:a16="http://schemas.microsoft.com/office/drawing/2014/main" xmlns="" id="{C1740923-F10F-411A-BDD6-16C4C38C554F}"/>
               </a:ext>
             </a:extLst>
           </p:cNvPr>
@@ -4304,7 +4305,7 @@
           <p:cNvPr id="5" name="四角形: 角を丸くする 4">
             <a:extLst>
               <a:ext uri="{FF2B5EF4-FFF2-40B4-BE49-F238E27FC236}">
-                <a16:creationId xmlns:a16="http://schemas.microsoft.com/office/drawing/2014/main" id="{CA2A35D6-3924-4391-8CE4-9A706CFF424E}"/>
+                <a16:creationId xmlns:a16="http://schemas.microsoft.com/office/drawing/2014/main" xmlns="" id="{CA2A35D6-3924-4391-8CE4-9A706CFF424E}"/>
               </a:ext>
             </a:extLst>
           </p:cNvPr>
@@ -4351,7 +4352,7 @@
           <p:cNvPr id="6" name="四角形: 角を丸くする 5">
             <a:extLst>
               <a:ext uri="{FF2B5EF4-FFF2-40B4-BE49-F238E27FC236}">
-                <a16:creationId xmlns:a16="http://schemas.microsoft.com/office/drawing/2014/main" id="{79CC0073-F04F-44AE-AE84-06308933C532}"/>
+                <a16:creationId xmlns:a16="http://schemas.microsoft.com/office/drawing/2014/main" xmlns="" id="{79CC0073-F04F-44AE-AE84-06308933C532}"/>
               </a:ext>
             </a:extLst>
           </p:cNvPr>
@@ -4406,7 +4407,7 @@
           <p:cNvPr id="8" name="矢印: 下 7">
             <a:extLst>
               <a:ext uri="{FF2B5EF4-FFF2-40B4-BE49-F238E27FC236}">
-                <a16:creationId xmlns:a16="http://schemas.microsoft.com/office/drawing/2014/main" id="{591B8A5E-8967-4C79-9E95-3D0BC034A521}"/>
+                <a16:creationId xmlns:a16="http://schemas.microsoft.com/office/drawing/2014/main" xmlns="" id="{591B8A5E-8967-4C79-9E95-3D0BC034A521}"/>
               </a:ext>
             </a:extLst>
           </p:cNvPr>
@@ -4461,7 +4462,7 @@
           <p:cNvPr id="9" name="テキスト ボックス 8">
             <a:extLst>
               <a:ext uri="{FF2B5EF4-FFF2-40B4-BE49-F238E27FC236}">
-                <a16:creationId xmlns:a16="http://schemas.microsoft.com/office/drawing/2014/main" id="{EF43DEC5-5543-424A-9D8B-557507A3A39F}"/>
+                <a16:creationId xmlns:a16="http://schemas.microsoft.com/office/drawing/2014/main" xmlns="" id="{EF43DEC5-5543-424A-9D8B-557507A3A39F}"/>
               </a:ext>
             </a:extLst>
           </p:cNvPr>
@@ -4505,7 +4506,7 @@
           <p:cNvPr id="1026" name="Picture 2" descr="http://2.bp.blogspot.com/-SzUpWyVSpbE/WTd4c4ctH-I/AAAAAAABEno/S_9rmVP7j6IJoiSCHMqqSKJytroxZqT0ACLcB/s800/dada_kosodate_komaru_woman.png">
             <a:extLst>
               <a:ext uri="{FF2B5EF4-FFF2-40B4-BE49-F238E27FC236}">
-                <a16:creationId xmlns:a16="http://schemas.microsoft.com/office/drawing/2014/main" id="{D5D52A8E-81D9-441D-99B2-9B9617A0482C}"/>
+                <a16:creationId xmlns:a16="http://schemas.microsoft.com/office/drawing/2014/main" xmlns="" id="{D5D52A8E-81D9-441D-99B2-9B9617A0482C}"/>
               </a:ext>
             </a:extLst>
           </p:cNvPr>
@@ -4550,7 +4551,7 @@
           <p:cNvPr id="1028" name="Picture 4" descr="「いらすとや 落ち込む」の画像検索結果">
             <a:extLst>
               <a:ext uri="{FF2B5EF4-FFF2-40B4-BE49-F238E27FC236}">
-                <a16:creationId xmlns:a16="http://schemas.microsoft.com/office/drawing/2014/main" id="{7611E2F7-9E65-4358-93A3-D279D4BEE7DF}"/>
+                <a16:creationId xmlns:a16="http://schemas.microsoft.com/office/drawing/2014/main" xmlns="" id="{7611E2F7-9E65-4358-93A3-D279D4BEE7DF}"/>
               </a:ext>
             </a:extLst>
           </p:cNvPr>
@@ -4597,7 +4598,7 @@
           <p:cNvPr id="10" name="テキスト ボックス 9">
             <a:extLst>
               <a:ext uri="{FF2B5EF4-FFF2-40B4-BE49-F238E27FC236}">
-                <a16:creationId xmlns:a16="http://schemas.microsoft.com/office/drawing/2014/main" id="{C24CE291-1EBD-48CD-92D1-22E34F066E31}"/>
+                <a16:creationId xmlns:a16="http://schemas.microsoft.com/office/drawing/2014/main" xmlns="" id="{C24CE291-1EBD-48CD-92D1-22E34F066E31}"/>
               </a:ext>
             </a:extLst>
           </p:cNvPr>
@@ -4663,7 +4664,7 @@
           <p:cNvPr id="21" name="直線コネクタ 20">
             <a:extLst>
               <a:ext uri="{FF2B5EF4-FFF2-40B4-BE49-F238E27FC236}">
-                <a16:creationId xmlns:a16="http://schemas.microsoft.com/office/drawing/2014/main" id="{1B912E8B-AC56-43E1-BC69-DD45D157BD26}"/>
+                <a16:creationId xmlns:a16="http://schemas.microsoft.com/office/drawing/2014/main" xmlns="" id="{1B912E8B-AC56-43E1-BC69-DD45D157BD26}"/>
               </a:ext>
             </a:extLst>
           </p:cNvPr>
@@ -4701,7 +4702,7 @@
           <p:cNvPr id="19" name="直線コネクタ 18">
             <a:extLst>
               <a:ext uri="{FF2B5EF4-FFF2-40B4-BE49-F238E27FC236}">
-                <a16:creationId xmlns:a16="http://schemas.microsoft.com/office/drawing/2014/main" id="{BE056CDB-B7E1-4280-BE0E-239CA5F35DB8}"/>
+                <a16:creationId xmlns:a16="http://schemas.microsoft.com/office/drawing/2014/main" xmlns="" id="{BE056CDB-B7E1-4280-BE0E-239CA5F35DB8}"/>
               </a:ext>
             </a:extLst>
           </p:cNvPr>
@@ -4740,7 +4741,7 @@
           <p:cNvPr id="10" name="直線コネクタ 9">
             <a:extLst>
               <a:ext uri="{FF2B5EF4-FFF2-40B4-BE49-F238E27FC236}">
-                <a16:creationId xmlns:a16="http://schemas.microsoft.com/office/drawing/2014/main" id="{0C9E4426-490D-4BF0-87D1-811FF85E37C6}"/>
+                <a16:creationId xmlns:a16="http://schemas.microsoft.com/office/drawing/2014/main" xmlns="" id="{0C9E4426-490D-4BF0-87D1-811FF85E37C6}"/>
               </a:ext>
             </a:extLst>
           </p:cNvPr>
@@ -4778,7 +4779,7 @@
           <p:cNvPr id="2" name="タイトル 1">
             <a:extLst>
               <a:ext uri="{FF2B5EF4-FFF2-40B4-BE49-F238E27FC236}">
-                <a16:creationId xmlns:a16="http://schemas.microsoft.com/office/drawing/2014/main" id="{0251162F-4B75-4892-86F3-AA5EB5FCE329}"/>
+                <a16:creationId xmlns:a16="http://schemas.microsoft.com/office/drawing/2014/main" xmlns="" id="{0251162F-4B75-4892-86F3-AA5EB5FCE329}"/>
               </a:ext>
             </a:extLst>
           </p:cNvPr>
@@ -4807,7 +4808,7 @@
           <p:cNvPr id="4" name="スライド番号プレースホルダー 3">
             <a:extLst>
               <a:ext uri="{FF2B5EF4-FFF2-40B4-BE49-F238E27FC236}">
-                <a16:creationId xmlns:a16="http://schemas.microsoft.com/office/drawing/2014/main" id="{010A9CE2-1A71-4321-A8CB-207C9D92A314}"/>
+                <a16:creationId xmlns:a16="http://schemas.microsoft.com/office/drawing/2014/main" xmlns="" id="{010A9CE2-1A71-4321-A8CB-207C9D92A314}"/>
               </a:ext>
             </a:extLst>
           </p:cNvPr>
@@ -4837,7 +4838,7 @@
           <p:cNvPr id="2050" name="Picture 2" descr="http://3.bp.blogspot.com/-eeKtlyYSfe8/Vw5K1QLNDtI/AAAAAAAA5to/_eOHo42KjKsi5VIPuCN7NlNuoI15u98DwCLcB/s800/pose_necchuu_smartphone_man.png">
             <a:extLst>
               <a:ext uri="{FF2B5EF4-FFF2-40B4-BE49-F238E27FC236}">
-                <a16:creationId xmlns:a16="http://schemas.microsoft.com/office/drawing/2014/main" id="{F700D07D-F2AE-432B-9853-BE8AF88FCF1C}"/>
+                <a16:creationId xmlns:a16="http://schemas.microsoft.com/office/drawing/2014/main" xmlns="" id="{F700D07D-F2AE-432B-9853-BE8AF88FCF1C}"/>
               </a:ext>
             </a:extLst>
           </p:cNvPr>
@@ -4884,7 +4885,7 @@
           <p:cNvPr id="2052" name="Picture 4" descr="「いらすとや スマホ」の画像検索結果">
             <a:extLst>
               <a:ext uri="{FF2B5EF4-FFF2-40B4-BE49-F238E27FC236}">
-                <a16:creationId xmlns:a16="http://schemas.microsoft.com/office/drawing/2014/main" id="{D302976E-A4EC-4063-AA21-CF30A6850386}"/>
+                <a16:creationId xmlns:a16="http://schemas.microsoft.com/office/drawing/2014/main" xmlns="" id="{D302976E-A4EC-4063-AA21-CF30A6850386}"/>
               </a:ext>
             </a:extLst>
           </p:cNvPr>
@@ -4931,7 +4932,7 @@
           <p:cNvPr id="2054" name="Picture 6" descr="http://3.bp.blogspot.com/-C9l4jn_oClE/U3WdDn9_XvI/AAAAAAAAgmE/O03V3A-iHLo/s800/asagao_hachiue.png">
             <a:extLst>
               <a:ext uri="{FF2B5EF4-FFF2-40B4-BE49-F238E27FC236}">
-                <a16:creationId xmlns:a16="http://schemas.microsoft.com/office/drawing/2014/main" id="{60C87C78-64CA-4288-8DDA-D591F04758AE}"/>
+                <a16:creationId xmlns:a16="http://schemas.microsoft.com/office/drawing/2014/main" xmlns="" id="{60C87C78-64CA-4288-8DDA-D591F04758AE}"/>
               </a:ext>
             </a:extLst>
           </p:cNvPr>
@@ -4978,7 +4979,7 @@
           <p:cNvPr id="8" name="Picture 6" descr="http://3.bp.blogspot.com/-C9l4jn_oClE/U3WdDn9_XvI/AAAAAAAAgmE/O03V3A-iHLo/s800/asagao_hachiue.png">
             <a:extLst>
               <a:ext uri="{FF2B5EF4-FFF2-40B4-BE49-F238E27FC236}">
-                <a16:creationId xmlns:a16="http://schemas.microsoft.com/office/drawing/2014/main" id="{00F6E0A9-E6B0-4460-968E-9DE86261DA66}"/>
+                <a16:creationId xmlns:a16="http://schemas.microsoft.com/office/drawing/2014/main" xmlns="" id="{00F6E0A9-E6B0-4460-968E-9DE86261DA66}"/>
               </a:ext>
             </a:extLst>
           </p:cNvPr>
@@ -5025,7 +5026,7 @@
           <p:cNvPr id="5" name="爆発: 14 pt 4">
             <a:extLst>
               <a:ext uri="{FF2B5EF4-FFF2-40B4-BE49-F238E27FC236}">
-                <a16:creationId xmlns:a16="http://schemas.microsoft.com/office/drawing/2014/main" id="{20FA0891-584F-4FA4-9750-CA567EC79CF0}"/>
+                <a16:creationId xmlns:a16="http://schemas.microsoft.com/office/drawing/2014/main" xmlns="" id="{20FA0891-584F-4FA4-9750-CA567EC79CF0}"/>
               </a:ext>
             </a:extLst>
           </p:cNvPr>
@@ -5089,7 +5090,7 @@
           <p:cNvPr id="17" name="吹き出し: 角を丸めた四角形 16">
             <a:extLst>
               <a:ext uri="{FF2B5EF4-FFF2-40B4-BE49-F238E27FC236}">
-                <a16:creationId xmlns:a16="http://schemas.microsoft.com/office/drawing/2014/main" id="{27173037-EEB1-400B-96F8-65734E47D7B8}"/>
+                <a16:creationId xmlns:a16="http://schemas.microsoft.com/office/drawing/2014/main" xmlns="" id="{27173037-EEB1-400B-96F8-65734E47D7B8}"/>
               </a:ext>
             </a:extLst>
           </p:cNvPr>
@@ -5178,7 +5179,7 @@
           <p:cNvPr id="23" name="吹き出し: 角を丸めた四角形 22">
             <a:extLst>
               <a:ext uri="{FF2B5EF4-FFF2-40B4-BE49-F238E27FC236}">
-                <a16:creationId xmlns:a16="http://schemas.microsoft.com/office/drawing/2014/main" id="{39098E12-FD50-422D-B499-080A1EF41CCF}"/>
+                <a16:creationId xmlns:a16="http://schemas.microsoft.com/office/drawing/2014/main" xmlns="" id="{39098E12-FD50-422D-B499-080A1EF41CCF}"/>
               </a:ext>
             </a:extLst>
           </p:cNvPr>
@@ -5277,7 +5278,7 @@
           <p:cNvPr id="18" name="テキスト ボックス 17">
             <a:extLst>
               <a:ext uri="{FF2B5EF4-FFF2-40B4-BE49-F238E27FC236}">
-                <a16:creationId xmlns:a16="http://schemas.microsoft.com/office/drawing/2014/main" id="{2E0EA560-CD2C-442F-8829-2BAAEF8161BF}"/>
+                <a16:creationId xmlns:a16="http://schemas.microsoft.com/office/drawing/2014/main" xmlns="" id="{2E0EA560-CD2C-442F-8829-2BAAEF8161BF}"/>
               </a:ext>
             </a:extLst>
           </p:cNvPr>
@@ -5350,7 +5351,7 @@
           <p:cNvPr id="2" name="タイトル 1">
             <a:extLst>
               <a:ext uri="{FF2B5EF4-FFF2-40B4-BE49-F238E27FC236}">
-                <a16:creationId xmlns:a16="http://schemas.microsoft.com/office/drawing/2014/main" id="{D4E4C359-042A-4C8A-BB99-E1303E6776EC}"/>
+                <a16:creationId xmlns:a16="http://schemas.microsoft.com/office/drawing/2014/main" xmlns="" id="{D4E4C359-042A-4C8A-BB99-E1303E6776EC}"/>
               </a:ext>
             </a:extLst>
           </p:cNvPr>
@@ -5378,7 +5379,7 @@
           <p:cNvPr id="3" name="コンテンツ プレースホルダー 2">
             <a:extLst>
               <a:ext uri="{FF2B5EF4-FFF2-40B4-BE49-F238E27FC236}">
-                <a16:creationId xmlns:a16="http://schemas.microsoft.com/office/drawing/2014/main" id="{B0D27BF0-FB34-47CC-B929-93BDB8AA9AE8}"/>
+                <a16:creationId xmlns:a16="http://schemas.microsoft.com/office/drawing/2014/main" xmlns="" id="{B0D27BF0-FB34-47CC-B929-93BDB8AA9AE8}"/>
               </a:ext>
             </a:extLst>
           </p:cNvPr>
@@ -5411,7 +5412,7 @@
           <p:cNvPr id="4" name="スライド番号プレースホルダー 3">
             <a:extLst>
               <a:ext uri="{FF2B5EF4-FFF2-40B4-BE49-F238E27FC236}">
-                <a16:creationId xmlns:a16="http://schemas.microsoft.com/office/drawing/2014/main" id="{8D39C2F9-2CF5-4C96-AC22-D0F57B5F9FFD}"/>
+                <a16:creationId xmlns:a16="http://schemas.microsoft.com/office/drawing/2014/main" xmlns="" id="{8D39C2F9-2CF5-4C96-AC22-D0F57B5F9FFD}"/>
               </a:ext>
             </a:extLst>
           </p:cNvPr>
@@ -5441,7 +5442,7 @@
           <p:cNvPr id="3074" name="Picture 2" descr="http://cdn.instantshift.com/wp-content/uploads/2016/02/free-android-smartphones-mockup-psd-026.jpg">
             <a:extLst>
               <a:ext uri="{FF2B5EF4-FFF2-40B4-BE49-F238E27FC236}">
-                <a16:creationId xmlns:a16="http://schemas.microsoft.com/office/drawing/2014/main" id="{58BB4DF6-32D7-481E-B65B-04BCE879E4BC}"/>
+                <a16:creationId xmlns:a16="http://schemas.microsoft.com/office/drawing/2014/main" xmlns="" id="{58BB4DF6-32D7-481E-B65B-04BCE879E4BC}"/>
               </a:ext>
             </a:extLst>
           </p:cNvPr>
@@ -5496,7 +5497,7 @@
           <p:cNvPr id="6" name="Picture 2" descr="http://cdn.instantshift.com/wp-content/uploads/2016/02/free-android-smartphones-mockup-psd-026.jpg">
             <a:extLst>
               <a:ext uri="{FF2B5EF4-FFF2-40B4-BE49-F238E27FC236}">
-                <a16:creationId xmlns:a16="http://schemas.microsoft.com/office/drawing/2014/main" id="{9622BD33-7F03-4DFC-8598-7E6A7E9AC4A4}"/>
+                <a16:creationId xmlns:a16="http://schemas.microsoft.com/office/drawing/2014/main" xmlns="" id="{9622BD33-7F03-4DFC-8598-7E6A7E9AC4A4}"/>
               </a:ext>
             </a:extLst>
           </p:cNvPr>
@@ -5551,7 +5552,7 @@
           <p:cNvPr id="5" name="正方形/長方形 4">
             <a:extLst>
               <a:ext uri="{FF2B5EF4-FFF2-40B4-BE49-F238E27FC236}">
-                <a16:creationId xmlns:a16="http://schemas.microsoft.com/office/drawing/2014/main" id="{4A057ADC-79B3-4B08-B5DB-1AD299FA0098}"/>
+                <a16:creationId xmlns:a16="http://schemas.microsoft.com/office/drawing/2014/main" xmlns="" id="{4A057ADC-79B3-4B08-B5DB-1AD299FA0098}"/>
               </a:ext>
             </a:extLst>
           </p:cNvPr>
@@ -5605,7 +5606,7 @@
           <p:cNvPr id="8" name="正方形/長方形 7">
             <a:extLst>
               <a:ext uri="{FF2B5EF4-FFF2-40B4-BE49-F238E27FC236}">
-                <a16:creationId xmlns:a16="http://schemas.microsoft.com/office/drawing/2014/main" id="{1F01B099-C328-466C-A2FD-A26BCB38ECEE}"/>
+                <a16:creationId xmlns:a16="http://schemas.microsoft.com/office/drawing/2014/main" xmlns="" id="{1F01B099-C328-466C-A2FD-A26BCB38ECEE}"/>
               </a:ext>
             </a:extLst>
           </p:cNvPr>
@@ -5659,7 +5660,7 @@
           <p:cNvPr id="9" name="斜め縞 8">
             <a:extLst>
               <a:ext uri="{FF2B5EF4-FFF2-40B4-BE49-F238E27FC236}">
-                <a16:creationId xmlns:a16="http://schemas.microsoft.com/office/drawing/2014/main" id="{A37F0649-392F-4D8C-8FAC-D5AED95D5967}"/>
+                <a16:creationId xmlns:a16="http://schemas.microsoft.com/office/drawing/2014/main" xmlns="" id="{A37F0649-392F-4D8C-8FAC-D5AED95D5967}"/>
               </a:ext>
             </a:extLst>
           </p:cNvPr>
@@ -5717,7 +5718,7 @@
           <p:cNvPr id="7" name="楕円 6">
             <a:extLst>
               <a:ext uri="{FF2B5EF4-FFF2-40B4-BE49-F238E27FC236}">
-                <a16:creationId xmlns:a16="http://schemas.microsoft.com/office/drawing/2014/main" id="{C1EB3A8E-2720-437B-B422-11CD196A538F}"/>
+                <a16:creationId xmlns:a16="http://schemas.microsoft.com/office/drawing/2014/main" xmlns="" id="{C1EB3A8E-2720-437B-B422-11CD196A538F}"/>
               </a:ext>
             </a:extLst>
           </p:cNvPr>
@@ -5771,7 +5772,7 @@
           <p:cNvPr id="11" name="斜め縞 10">
             <a:extLst>
               <a:ext uri="{FF2B5EF4-FFF2-40B4-BE49-F238E27FC236}">
-                <a16:creationId xmlns:a16="http://schemas.microsoft.com/office/drawing/2014/main" id="{53139A3C-F1B8-4EDA-944F-A5703947692D}"/>
+                <a16:creationId xmlns:a16="http://schemas.microsoft.com/office/drawing/2014/main" xmlns="" id="{53139A3C-F1B8-4EDA-944F-A5703947692D}"/>
               </a:ext>
             </a:extLst>
           </p:cNvPr>
@@ -5829,7 +5830,7 @@
           <p:cNvPr id="12" name="楕円 11">
             <a:extLst>
               <a:ext uri="{FF2B5EF4-FFF2-40B4-BE49-F238E27FC236}">
-                <a16:creationId xmlns:a16="http://schemas.microsoft.com/office/drawing/2014/main" id="{D33C16D6-EDF8-445E-9D80-E54AFD905908}"/>
+                <a16:creationId xmlns:a16="http://schemas.microsoft.com/office/drawing/2014/main" xmlns="" id="{D33C16D6-EDF8-445E-9D80-E54AFD905908}"/>
               </a:ext>
             </a:extLst>
           </p:cNvPr>
@@ -5883,7 +5884,7 @@
           <p:cNvPr id="13" name="斜め縞 12">
             <a:extLst>
               <a:ext uri="{FF2B5EF4-FFF2-40B4-BE49-F238E27FC236}">
-                <a16:creationId xmlns:a16="http://schemas.microsoft.com/office/drawing/2014/main" id="{EFC1EBCD-FF2B-497E-B581-7FB47DEDA4CE}"/>
+                <a16:creationId xmlns:a16="http://schemas.microsoft.com/office/drawing/2014/main" xmlns="" id="{EFC1EBCD-FF2B-497E-B581-7FB47DEDA4CE}"/>
               </a:ext>
             </a:extLst>
           </p:cNvPr>
@@ -5941,7 +5942,7 @@
           <p:cNvPr id="14" name="楕円 13">
             <a:extLst>
               <a:ext uri="{FF2B5EF4-FFF2-40B4-BE49-F238E27FC236}">
-                <a16:creationId xmlns:a16="http://schemas.microsoft.com/office/drawing/2014/main" id="{0EB10979-ADC0-4912-9AED-F6ED6E9F75CA}"/>
+                <a16:creationId xmlns:a16="http://schemas.microsoft.com/office/drawing/2014/main" xmlns="" id="{0EB10979-ADC0-4912-9AED-F6ED6E9F75CA}"/>
               </a:ext>
             </a:extLst>
           </p:cNvPr>
@@ -5995,7 +5996,7 @@
           <p:cNvPr id="15" name="斜め縞 14">
             <a:extLst>
               <a:ext uri="{FF2B5EF4-FFF2-40B4-BE49-F238E27FC236}">
-                <a16:creationId xmlns:a16="http://schemas.microsoft.com/office/drawing/2014/main" id="{8EB4FDA9-A039-48F6-B60A-646D59D9712A}"/>
+                <a16:creationId xmlns:a16="http://schemas.microsoft.com/office/drawing/2014/main" xmlns="" id="{8EB4FDA9-A039-48F6-B60A-646D59D9712A}"/>
               </a:ext>
             </a:extLst>
           </p:cNvPr>
@@ -6053,7 +6054,7 @@
           <p:cNvPr id="16" name="楕円 15">
             <a:extLst>
               <a:ext uri="{FF2B5EF4-FFF2-40B4-BE49-F238E27FC236}">
-                <a16:creationId xmlns:a16="http://schemas.microsoft.com/office/drawing/2014/main" id="{74F699B0-D779-4A54-8B31-C2A70A5F60C8}"/>
+                <a16:creationId xmlns:a16="http://schemas.microsoft.com/office/drawing/2014/main" xmlns="" id="{74F699B0-D779-4A54-8B31-C2A70A5F60C8}"/>
               </a:ext>
             </a:extLst>
           </p:cNvPr>
@@ -6107,7 +6108,7 @@
           <p:cNvPr id="10" name="正方形/長方形 9">
             <a:extLst>
               <a:ext uri="{FF2B5EF4-FFF2-40B4-BE49-F238E27FC236}">
-                <a16:creationId xmlns:a16="http://schemas.microsoft.com/office/drawing/2014/main" id="{98ECB669-E1E9-4D3D-902B-6B33A20EAE63}"/>
+                <a16:creationId xmlns:a16="http://schemas.microsoft.com/office/drawing/2014/main" xmlns="" id="{98ECB669-E1E9-4D3D-902B-6B33A20EAE63}"/>
               </a:ext>
             </a:extLst>
           </p:cNvPr>
@@ -6156,7 +6157,7 @@
           <p:cNvPr id="18" name="正方形/長方形 17">
             <a:extLst>
               <a:ext uri="{FF2B5EF4-FFF2-40B4-BE49-F238E27FC236}">
-                <a16:creationId xmlns:a16="http://schemas.microsoft.com/office/drawing/2014/main" id="{3BD017CB-2BC5-4BE9-A955-8F8B26F66C7C}"/>
+                <a16:creationId xmlns:a16="http://schemas.microsoft.com/office/drawing/2014/main" xmlns="" id="{3BD017CB-2BC5-4BE9-A955-8F8B26F66C7C}"/>
               </a:ext>
             </a:extLst>
           </p:cNvPr>
@@ -6205,7 +6206,7 @@
           <p:cNvPr id="17" name="楕円 16">
             <a:extLst>
               <a:ext uri="{FF2B5EF4-FFF2-40B4-BE49-F238E27FC236}">
-                <a16:creationId xmlns:a16="http://schemas.microsoft.com/office/drawing/2014/main" id="{BA6516FE-57B7-42D6-B2D5-19345392BC8A}"/>
+                <a16:creationId xmlns:a16="http://schemas.microsoft.com/office/drawing/2014/main" xmlns="" id="{BA6516FE-57B7-42D6-B2D5-19345392BC8A}"/>
               </a:ext>
             </a:extLst>
           </p:cNvPr>
@@ -6262,7 +6263,7 @@
           <p:cNvPr id="20" name="直線コネクタ 19">
             <a:extLst>
               <a:ext uri="{FF2B5EF4-FFF2-40B4-BE49-F238E27FC236}">
-                <a16:creationId xmlns:a16="http://schemas.microsoft.com/office/drawing/2014/main" id="{4627F8E9-976F-4ADC-9614-EA9B21AEBACD}"/>
+                <a16:creationId xmlns:a16="http://schemas.microsoft.com/office/drawing/2014/main" xmlns="" id="{4627F8E9-976F-4ADC-9614-EA9B21AEBACD}"/>
               </a:ext>
             </a:extLst>
           </p:cNvPr>
@@ -6305,7 +6306,7 @@
           <p:cNvPr id="25" name="直線コネクタ 24">
             <a:extLst>
               <a:ext uri="{FF2B5EF4-FFF2-40B4-BE49-F238E27FC236}">
-                <a16:creationId xmlns:a16="http://schemas.microsoft.com/office/drawing/2014/main" id="{96FF28A2-B3D7-4419-9F2C-1D544A351302}"/>
+                <a16:creationId xmlns:a16="http://schemas.microsoft.com/office/drawing/2014/main" xmlns="" id="{96FF28A2-B3D7-4419-9F2C-1D544A351302}"/>
               </a:ext>
             </a:extLst>
           </p:cNvPr>
@@ -6348,7 +6349,7 @@
           <p:cNvPr id="26" name="直線コネクタ 25">
             <a:extLst>
               <a:ext uri="{FF2B5EF4-FFF2-40B4-BE49-F238E27FC236}">
-                <a16:creationId xmlns:a16="http://schemas.microsoft.com/office/drawing/2014/main" id="{CFF9112A-A93F-4D9A-BD86-51365CE1D3C6}"/>
+                <a16:creationId xmlns:a16="http://schemas.microsoft.com/office/drawing/2014/main" xmlns="" id="{CFF9112A-A93F-4D9A-BD86-51365CE1D3C6}"/>
               </a:ext>
             </a:extLst>
           </p:cNvPr>
@@ -6391,7 +6392,7 @@
           <p:cNvPr id="27" name="楕円 26">
             <a:extLst>
               <a:ext uri="{FF2B5EF4-FFF2-40B4-BE49-F238E27FC236}">
-                <a16:creationId xmlns:a16="http://schemas.microsoft.com/office/drawing/2014/main" id="{831E8F10-1DED-458F-BE94-17E6B4F516B3}"/>
+                <a16:creationId xmlns:a16="http://schemas.microsoft.com/office/drawing/2014/main" xmlns="" id="{831E8F10-1DED-458F-BE94-17E6B4F516B3}"/>
               </a:ext>
             </a:extLst>
           </p:cNvPr>
@@ -6448,7 +6449,7 @@
           <p:cNvPr id="28" name="直線コネクタ 27">
             <a:extLst>
               <a:ext uri="{FF2B5EF4-FFF2-40B4-BE49-F238E27FC236}">
-                <a16:creationId xmlns:a16="http://schemas.microsoft.com/office/drawing/2014/main" id="{D3701E23-786A-402C-B676-490D9EB8EC10}"/>
+                <a16:creationId xmlns:a16="http://schemas.microsoft.com/office/drawing/2014/main" xmlns="" id="{D3701E23-786A-402C-B676-490D9EB8EC10}"/>
               </a:ext>
             </a:extLst>
           </p:cNvPr>
@@ -6491,7 +6492,7 @@
           <p:cNvPr id="29" name="直線コネクタ 28">
             <a:extLst>
               <a:ext uri="{FF2B5EF4-FFF2-40B4-BE49-F238E27FC236}">
-                <a16:creationId xmlns:a16="http://schemas.microsoft.com/office/drawing/2014/main" id="{D901A49A-CB09-4500-B33A-6C2F2785E427}"/>
+                <a16:creationId xmlns:a16="http://schemas.microsoft.com/office/drawing/2014/main" xmlns="" id="{D901A49A-CB09-4500-B33A-6C2F2785E427}"/>
               </a:ext>
             </a:extLst>
           </p:cNvPr>
@@ -6534,7 +6535,7 @@
           <p:cNvPr id="30" name="直線コネクタ 29">
             <a:extLst>
               <a:ext uri="{FF2B5EF4-FFF2-40B4-BE49-F238E27FC236}">
-                <a16:creationId xmlns:a16="http://schemas.microsoft.com/office/drawing/2014/main" id="{17908968-126A-416B-8DDB-7463E2CE327B}"/>
+                <a16:creationId xmlns:a16="http://schemas.microsoft.com/office/drawing/2014/main" xmlns="" id="{17908968-126A-416B-8DDB-7463E2CE327B}"/>
               </a:ext>
             </a:extLst>
           </p:cNvPr>
@@ -6577,7 +6578,7 @@
           <p:cNvPr id="31" name="楕円 30">
             <a:extLst>
               <a:ext uri="{FF2B5EF4-FFF2-40B4-BE49-F238E27FC236}">
-                <a16:creationId xmlns:a16="http://schemas.microsoft.com/office/drawing/2014/main" id="{85F40836-B094-4110-A994-461F7878D2DA}"/>
+                <a16:creationId xmlns:a16="http://schemas.microsoft.com/office/drawing/2014/main" xmlns="" id="{85F40836-B094-4110-A994-461F7878D2DA}"/>
               </a:ext>
             </a:extLst>
           </p:cNvPr>
@@ -6634,7 +6635,7 @@
           <p:cNvPr id="32" name="直線コネクタ 31">
             <a:extLst>
               <a:ext uri="{FF2B5EF4-FFF2-40B4-BE49-F238E27FC236}">
-                <a16:creationId xmlns:a16="http://schemas.microsoft.com/office/drawing/2014/main" id="{34018593-ACAC-4463-8954-F438827EB1EB}"/>
+                <a16:creationId xmlns:a16="http://schemas.microsoft.com/office/drawing/2014/main" xmlns="" id="{34018593-ACAC-4463-8954-F438827EB1EB}"/>
               </a:ext>
             </a:extLst>
           </p:cNvPr>
@@ -6677,7 +6678,7 @@
           <p:cNvPr id="33" name="直線コネクタ 32">
             <a:extLst>
               <a:ext uri="{FF2B5EF4-FFF2-40B4-BE49-F238E27FC236}">
-                <a16:creationId xmlns:a16="http://schemas.microsoft.com/office/drawing/2014/main" id="{4932F004-F5D9-484F-ABFD-698FAEFC6A6A}"/>
+                <a16:creationId xmlns:a16="http://schemas.microsoft.com/office/drawing/2014/main" xmlns="" id="{4932F004-F5D9-484F-ABFD-698FAEFC6A6A}"/>
               </a:ext>
             </a:extLst>
           </p:cNvPr>
@@ -6720,7 +6721,7 @@
           <p:cNvPr id="34" name="直線コネクタ 33">
             <a:extLst>
               <a:ext uri="{FF2B5EF4-FFF2-40B4-BE49-F238E27FC236}">
-                <a16:creationId xmlns:a16="http://schemas.microsoft.com/office/drawing/2014/main" id="{0D945EA9-1E32-459F-98B7-5420E6009B28}"/>
+                <a16:creationId xmlns:a16="http://schemas.microsoft.com/office/drawing/2014/main" xmlns="" id="{0D945EA9-1E32-459F-98B7-5420E6009B28}"/>
               </a:ext>
             </a:extLst>
           </p:cNvPr>
@@ -6763,7 +6764,7 @@
           <p:cNvPr id="35" name="楕円 34">
             <a:extLst>
               <a:ext uri="{FF2B5EF4-FFF2-40B4-BE49-F238E27FC236}">
-                <a16:creationId xmlns:a16="http://schemas.microsoft.com/office/drawing/2014/main" id="{43338CCE-3226-43A2-8929-CC1EB828F0E7}"/>
+                <a16:creationId xmlns:a16="http://schemas.microsoft.com/office/drawing/2014/main" xmlns="" id="{43338CCE-3226-43A2-8929-CC1EB828F0E7}"/>
               </a:ext>
             </a:extLst>
           </p:cNvPr>
@@ -6820,7 +6821,7 @@
           <p:cNvPr id="36" name="直線コネクタ 35">
             <a:extLst>
               <a:ext uri="{FF2B5EF4-FFF2-40B4-BE49-F238E27FC236}">
-                <a16:creationId xmlns:a16="http://schemas.microsoft.com/office/drawing/2014/main" id="{149C41E2-E043-4D88-BD34-D6111A94921E}"/>
+                <a16:creationId xmlns:a16="http://schemas.microsoft.com/office/drawing/2014/main" xmlns="" id="{149C41E2-E043-4D88-BD34-D6111A94921E}"/>
               </a:ext>
             </a:extLst>
           </p:cNvPr>
@@ -6863,7 +6864,7 @@
           <p:cNvPr id="37" name="直線コネクタ 36">
             <a:extLst>
               <a:ext uri="{FF2B5EF4-FFF2-40B4-BE49-F238E27FC236}">
-                <a16:creationId xmlns:a16="http://schemas.microsoft.com/office/drawing/2014/main" id="{A1E5CF52-2F99-4FEF-AE92-1E5FFC9AD7B0}"/>
+                <a16:creationId xmlns:a16="http://schemas.microsoft.com/office/drawing/2014/main" xmlns="" id="{A1E5CF52-2F99-4FEF-AE92-1E5FFC9AD7B0}"/>
               </a:ext>
             </a:extLst>
           </p:cNvPr>
@@ -6906,7 +6907,7 @@
           <p:cNvPr id="38" name="直線コネクタ 37">
             <a:extLst>
               <a:ext uri="{FF2B5EF4-FFF2-40B4-BE49-F238E27FC236}">
-                <a16:creationId xmlns:a16="http://schemas.microsoft.com/office/drawing/2014/main" id="{8656E130-16A5-4B7A-AE4A-59A987281EB8}"/>
+                <a16:creationId xmlns:a16="http://schemas.microsoft.com/office/drawing/2014/main" xmlns="" id="{8656E130-16A5-4B7A-AE4A-59A987281EB8}"/>
               </a:ext>
             </a:extLst>
           </p:cNvPr>
@@ -6949,7 +6950,7 @@
           <p:cNvPr id="23" name="雲 22">
             <a:extLst>
               <a:ext uri="{FF2B5EF4-FFF2-40B4-BE49-F238E27FC236}">
-                <a16:creationId xmlns:a16="http://schemas.microsoft.com/office/drawing/2014/main" id="{758BCC9E-1850-4153-9F1B-74D0D222FFF4}"/>
+                <a16:creationId xmlns:a16="http://schemas.microsoft.com/office/drawing/2014/main" xmlns="" id="{758BCC9E-1850-4153-9F1B-74D0D222FFF4}"/>
               </a:ext>
             </a:extLst>
           </p:cNvPr>
@@ -7019,7 +7020,7 @@
           <p:cNvPr id="40" name="直線コネクタ 39">
             <a:extLst>
               <a:ext uri="{FF2B5EF4-FFF2-40B4-BE49-F238E27FC236}">
-                <a16:creationId xmlns:a16="http://schemas.microsoft.com/office/drawing/2014/main" id="{B6428D9E-A392-40C0-8484-3834F3C5F282}"/>
+                <a16:creationId xmlns:a16="http://schemas.microsoft.com/office/drawing/2014/main" xmlns="" id="{B6428D9E-A392-40C0-8484-3834F3C5F282}"/>
               </a:ext>
             </a:extLst>
           </p:cNvPr>
@@ -7058,7 +7059,7 @@
           <p:cNvPr id="43" name="直線コネクタ 42">
             <a:extLst>
               <a:ext uri="{FF2B5EF4-FFF2-40B4-BE49-F238E27FC236}">
-                <a16:creationId xmlns:a16="http://schemas.microsoft.com/office/drawing/2014/main" id="{F6F41F08-9C8F-4999-AB6B-1B324BEDFC0F}"/>
+                <a16:creationId xmlns:a16="http://schemas.microsoft.com/office/drawing/2014/main" xmlns="" id="{F6F41F08-9C8F-4999-AB6B-1B324BEDFC0F}"/>
               </a:ext>
             </a:extLst>
           </p:cNvPr>
@@ -7097,7 +7098,7 @@
           <p:cNvPr id="44" name="楕円 43">
             <a:extLst>
               <a:ext uri="{FF2B5EF4-FFF2-40B4-BE49-F238E27FC236}">
-                <a16:creationId xmlns:a16="http://schemas.microsoft.com/office/drawing/2014/main" id="{E2DA5E5D-DF9D-428B-A5F8-58787258CBA5}"/>
+                <a16:creationId xmlns:a16="http://schemas.microsoft.com/office/drawing/2014/main" xmlns="" id="{E2DA5E5D-DF9D-428B-A5F8-58787258CBA5}"/>
               </a:ext>
             </a:extLst>
           </p:cNvPr>
@@ -7154,7 +7155,7 @@
           <p:cNvPr id="45" name="直線コネクタ 44">
             <a:extLst>
               <a:ext uri="{FF2B5EF4-FFF2-40B4-BE49-F238E27FC236}">
-                <a16:creationId xmlns:a16="http://schemas.microsoft.com/office/drawing/2014/main" id="{287BCC42-4C48-4DFE-8FF5-6DB02849F53E}"/>
+                <a16:creationId xmlns:a16="http://schemas.microsoft.com/office/drawing/2014/main" xmlns="" id="{287BCC42-4C48-4DFE-8FF5-6DB02849F53E}"/>
               </a:ext>
             </a:extLst>
           </p:cNvPr>
@@ -7197,7 +7198,7 @@
           <p:cNvPr id="46" name="直線コネクタ 45">
             <a:extLst>
               <a:ext uri="{FF2B5EF4-FFF2-40B4-BE49-F238E27FC236}">
-                <a16:creationId xmlns:a16="http://schemas.microsoft.com/office/drawing/2014/main" id="{BB4EFE68-570D-4585-B234-B0E6B1790D1B}"/>
+                <a16:creationId xmlns:a16="http://schemas.microsoft.com/office/drawing/2014/main" xmlns="" id="{BB4EFE68-570D-4585-B234-B0E6B1790D1B}"/>
               </a:ext>
             </a:extLst>
           </p:cNvPr>
@@ -7240,7 +7241,7 @@
           <p:cNvPr id="47" name="直線コネクタ 46">
             <a:extLst>
               <a:ext uri="{FF2B5EF4-FFF2-40B4-BE49-F238E27FC236}">
-                <a16:creationId xmlns:a16="http://schemas.microsoft.com/office/drawing/2014/main" id="{A4481745-AFF1-49D6-870F-BEB47C97DCAB}"/>
+                <a16:creationId xmlns:a16="http://schemas.microsoft.com/office/drawing/2014/main" xmlns="" id="{A4481745-AFF1-49D6-870F-BEB47C97DCAB}"/>
               </a:ext>
             </a:extLst>
           </p:cNvPr>
@@ -7283,7 +7284,7 @@
           <p:cNvPr id="48" name="楕円 47">
             <a:extLst>
               <a:ext uri="{FF2B5EF4-FFF2-40B4-BE49-F238E27FC236}">
-                <a16:creationId xmlns:a16="http://schemas.microsoft.com/office/drawing/2014/main" id="{9FA2D738-B571-41B9-B2D4-0ABE45B6D764}"/>
+                <a16:creationId xmlns:a16="http://schemas.microsoft.com/office/drawing/2014/main" xmlns="" id="{9FA2D738-B571-41B9-B2D4-0ABE45B6D764}"/>
               </a:ext>
             </a:extLst>
           </p:cNvPr>
@@ -7340,7 +7341,7 @@
           <p:cNvPr id="49" name="直線コネクタ 48">
             <a:extLst>
               <a:ext uri="{FF2B5EF4-FFF2-40B4-BE49-F238E27FC236}">
-                <a16:creationId xmlns:a16="http://schemas.microsoft.com/office/drawing/2014/main" id="{232E929E-676B-4082-BAB2-9FD907DA6F93}"/>
+                <a16:creationId xmlns:a16="http://schemas.microsoft.com/office/drawing/2014/main" xmlns="" id="{232E929E-676B-4082-BAB2-9FD907DA6F93}"/>
               </a:ext>
             </a:extLst>
           </p:cNvPr>
@@ -7383,7 +7384,7 @@
           <p:cNvPr id="50" name="直線コネクタ 49">
             <a:extLst>
               <a:ext uri="{FF2B5EF4-FFF2-40B4-BE49-F238E27FC236}">
-                <a16:creationId xmlns:a16="http://schemas.microsoft.com/office/drawing/2014/main" id="{1C445AD3-AB18-41E5-8B0E-F7CAAF01A507}"/>
+                <a16:creationId xmlns:a16="http://schemas.microsoft.com/office/drawing/2014/main" xmlns="" id="{1C445AD3-AB18-41E5-8B0E-F7CAAF01A507}"/>
               </a:ext>
             </a:extLst>
           </p:cNvPr>
@@ -7426,7 +7427,7 @@
           <p:cNvPr id="51" name="直線コネクタ 50">
             <a:extLst>
               <a:ext uri="{FF2B5EF4-FFF2-40B4-BE49-F238E27FC236}">
-                <a16:creationId xmlns:a16="http://schemas.microsoft.com/office/drawing/2014/main" id="{34CCF804-2773-4E1A-9C5B-0410707057C4}"/>
+                <a16:creationId xmlns:a16="http://schemas.microsoft.com/office/drawing/2014/main" xmlns="" id="{34CCF804-2773-4E1A-9C5B-0410707057C4}"/>
               </a:ext>
             </a:extLst>
           </p:cNvPr>
@@ -7469,7 +7470,7 @@
           <p:cNvPr id="52" name="直線矢印コネクタ 51">
             <a:extLst>
               <a:ext uri="{FF2B5EF4-FFF2-40B4-BE49-F238E27FC236}">
-                <a16:creationId xmlns:a16="http://schemas.microsoft.com/office/drawing/2014/main" id="{9F36C133-ADA3-45B2-84F8-90B2EAD2AB82}"/>
+                <a16:creationId xmlns:a16="http://schemas.microsoft.com/office/drawing/2014/main" xmlns="" id="{9F36C133-ADA3-45B2-84F8-90B2EAD2AB82}"/>
               </a:ext>
             </a:extLst>
           </p:cNvPr>
@@ -7508,7 +7509,7 @@
           <p:cNvPr id="53" name="テキスト ボックス 52">
             <a:extLst>
               <a:ext uri="{FF2B5EF4-FFF2-40B4-BE49-F238E27FC236}">
-                <a16:creationId xmlns:a16="http://schemas.microsoft.com/office/drawing/2014/main" id="{CC4BA679-4F4C-4DF7-84C7-303E6DB50DFD}"/>
+                <a16:creationId xmlns:a16="http://schemas.microsoft.com/office/drawing/2014/main" xmlns="" id="{CC4BA679-4F4C-4DF7-84C7-303E6DB50DFD}"/>
               </a:ext>
             </a:extLst>
           </p:cNvPr>
@@ -7597,7 +7598,7 @@
           <p:cNvPr id="56" name="正方形/長方形 55">
             <a:extLst>
               <a:ext uri="{FF2B5EF4-FFF2-40B4-BE49-F238E27FC236}">
-                <a16:creationId xmlns:a16="http://schemas.microsoft.com/office/drawing/2014/main" id="{51D940FE-50CF-49CD-AC89-0B4E1B5E6049}"/>
+                <a16:creationId xmlns:a16="http://schemas.microsoft.com/office/drawing/2014/main" xmlns="" id="{51D940FE-50CF-49CD-AC89-0B4E1B5E6049}"/>
               </a:ext>
             </a:extLst>
           </p:cNvPr>
@@ -7657,7 +7658,7 @@
           <p:cNvPr id="58" name="正方形/長方形 57">
             <a:extLst>
               <a:ext uri="{FF2B5EF4-FFF2-40B4-BE49-F238E27FC236}">
-                <a16:creationId xmlns:a16="http://schemas.microsoft.com/office/drawing/2014/main" id="{3686E7D2-02F0-4886-B5C9-3CFB58C2F898}"/>
+                <a16:creationId xmlns:a16="http://schemas.microsoft.com/office/drawing/2014/main" xmlns="" id="{3686E7D2-02F0-4886-B5C9-3CFB58C2F898}"/>
               </a:ext>
             </a:extLst>
           </p:cNvPr>
@@ -7717,7 +7718,7 @@
           <p:cNvPr id="61" name="楕円 60">
             <a:extLst>
               <a:ext uri="{FF2B5EF4-FFF2-40B4-BE49-F238E27FC236}">
-                <a16:creationId xmlns:a16="http://schemas.microsoft.com/office/drawing/2014/main" id="{420C3DCC-BA84-4A56-87FA-FBACC2B71960}"/>
+                <a16:creationId xmlns:a16="http://schemas.microsoft.com/office/drawing/2014/main" xmlns="" id="{420C3DCC-BA84-4A56-87FA-FBACC2B71960}"/>
               </a:ext>
             </a:extLst>
           </p:cNvPr>
@@ -7774,7 +7775,7 @@
           <p:cNvPr id="62" name="楕円 61">
             <a:extLst>
               <a:ext uri="{FF2B5EF4-FFF2-40B4-BE49-F238E27FC236}">
-                <a16:creationId xmlns:a16="http://schemas.microsoft.com/office/drawing/2014/main" id="{919B37CF-08A5-48E4-BA55-F586ED6CD2BB}"/>
+                <a16:creationId xmlns:a16="http://schemas.microsoft.com/office/drawing/2014/main" xmlns="" id="{919B37CF-08A5-48E4-BA55-F586ED6CD2BB}"/>
               </a:ext>
             </a:extLst>
           </p:cNvPr>
@@ -7831,7 +7832,7 @@
           <p:cNvPr id="63" name="正方形/長方形 62">
             <a:extLst>
               <a:ext uri="{FF2B5EF4-FFF2-40B4-BE49-F238E27FC236}">
-                <a16:creationId xmlns:a16="http://schemas.microsoft.com/office/drawing/2014/main" id="{F5482022-20D4-41E6-AC18-9F5675EC664B}"/>
+                <a16:creationId xmlns:a16="http://schemas.microsoft.com/office/drawing/2014/main" xmlns="" id="{F5482022-20D4-41E6-AC18-9F5675EC664B}"/>
               </a:ext>
             </a:extLst>
           </p:cNvPr>
@@ -7891,7 +7892,7 @@
           <p:cNvPr id="64" name="正方形/長方形 63">
             <a:extLst>
               <a:ext uri="{FF2B5EF4-FFF2-40B4-BE49-F238E27FC236}">
-                <a16:creationId xmlns:a16="http://schemas.microsoft.com/office/drawing/2014/main" id="{E04A144E-E329-4974-ACB9-C063B6DE94AE}"/>
+                <a16:creationId xmlns:a16="http://schemas.microsoft.com/office/drawing/2014/main" xmlns="" id="{E04A144E-E329-4974-ACB9-C063B6DE94AE}"/>
               </a:ext>
             </a:extLst>
           </p:cNvPr>
@@ -7951,7 +7952,7 @@
           <p:cNvPr id="65" name="楕円 64">
             <a:extLst>
               <a:ext uri="{FF2B5EF4-FFF2-40B4-BE49-F238E27FC236}">
-                <a16:creationId xmlns:a16="http://schemas.microsoft.com/office/drawing/2014/main" id="{387E2824-9939-4743-AFBA-1E2E94EA4779}"/>
+                <a16:creationId xmlns:a16="http://schemas.microsoft.com/office/drawing/2014/main" xmlns="" id="{387E2824-9939-4743-AFBA-1E2E94EA4779}"/>
               </a:ext>
             </a:extLst>
           </p:cNvPr>
@@ -8008,7 +8009,7 @@
           <p:cNvPr id="66" name="楕円 65">
             <a:extLst>
               <a:ext uri="{FF2B5EF4-FFF2-40B4-BE49-F238E27FC236}">
-                <a16:creationId xmlns:a16="http://schemas.microsoft.com/office/drawing/2014/main" id="{DC773A9A-CBF9-42EA-A360-E51A042BE483}"/>
+                <a16:creationId xmlns:a16="http://schemas.microsoft.com/office/drawing/2014/main" xmlns="" id="{DC773A9A-CBF9-42EA-A360-E51A042BE483}"/>
               </a:ext>
             </a:extLst>
           </p:cNvPr>
@@ -8065,7 +8066,7 @@
           <p:cNvPr id="67" name="直線矢印コネクタ 66">
             <a:extLst>
               <a:ext uri="{FF2B5EF4-FFF2-40B4-BE49-F238E27FC236}">
-                <a16:creationId xmlns:a16="http://schemas.microsoft.com/office/drawing/2014/main" id="{24F32BE7-C12D-40E2-AB73-438E07A83E12}"/>
+                <a16:creationId xmlns:a16="http://schemas.microsoft.com/office/drawing/2014/main" xmlns="" id="{24F32BE7-C12D-40E2-AB73-438E07A83E12}"/>
               </a:ext>
             </a:extLst>
           </p:cNvPr>
@@ -8106,7 +8107,7 @@
           <p:cNvPr id="70" name="テキスト ボックス 69">
             <a:extLst>
               <a:ext uri="{FF2B5EF4-FFF2-40B4-BE49-F238E27FC236}">
-                <a16:creationId xmlns:a16="http://schemas.microsoft.com/office/drawing/2014/main" id="{4C57F72F-0938-44ED-95B6-353B285DBCF4}"/>
+                <a16:creationId xmlns:a16="http://schemas.microsoft.com/office/drawing/2014/main" xmlns="" id="{4C57F72F-0938-44ED-95B6-353B285DBCF4}"/>
               </a:ext>
             </a:extLst>
           </p:cNvPr>
@@ -8161,7 +8162,7 @@
           <p:cNvPr id="71" name="直線矢印コネクタ 70">
             <a:extLst>
               <a:ext uri="{FF2B5EF4-FFF2-40B4-BE49-F238E27FC236}">
-                <a16:creationId xmlns:a16="http://schemas.microsoft.com/office/drawing/2014/main" id="{557D6550-869E-4A78-A29B-3D1E539534F7}"/>
+                <a16:creationId xmlns:a16="http://schemas.microsoft.com/office/drawing/2014/main" xmlns="" id="{557D6550-869E-4A78-A29B-3D1E539534F7}"/>
               </a:ext>
             </a:extLst>
           </p:cNvPr>
@@ -8202,7 +8203,7 @@
           <p:cNvPr id="74" name="テキスト ボックス 73">
             <a:extLst>
               <a:ext uri="{FF2B5EF4-FFF2-40B4-BE49-F238E27FC236}">
-                <a16:creationId xmlns:a16="http://schemas.microsoft.com/office/drawing/2014/main" id="{22AFD877-FF72-48E4-870C-AE218E723DA5}"/>
+                <a16:creationId xmlns:a16="http://schemas.microsoft.com/office/drawing/2014/main" xmlns="" id="{22AFD877-FF72-48E4-870C-AE218E723DA5}"/>
               </a:ext>
             </a:extLst>
           </p:cNvPr>
@@ -8245,7 +8246,7 @@
           <p:cNvPr id="73" name="テキスト ボックス 72">
             <a:extLst>
               <a:ext uri="{FF2B5EF4-FFF2-40B4-BE49-F238E27FC236}">
-                <a16:creationId xmlns:a16="http://schemas.microsoft.com/office/drawing/2014/main" id="{9D18E596-0ACF-4B77-AED2-DB44F31E81E4}"/>
+                <a16:creationId xmlns:a16="http://schemas.microsoft.com/office/drawing/2014/main" xmlns="" id="{9D18E596-0ACF-4B77-AED2-DB44F31E81E4}"/>
               </a:ext>
             </a:extLst>
           </p:cNvPr>
@@ -8289,7 +8290,7 @@
           <p:cNvPr id="76" name="正方形/長方形 75">
             <a:extLst>
               <a:ext uri="{FF2B5EF4-FFF2-40B4-BE49-F238E27FC236}">
-                <a16:creationId xmlns:a16="http://schemas.microsoft.com/office/drawing/2014/main" id="{253FC7D4-72E0-4703-84F1-0162AD7B0135}"/>
+                <a16:creationId xmlns:a16="http://schemas.microsoft.com/office/drawing/2014/main" xmlns="" id="{253FC7D4-72E0-4703-84F1-0162AD7B0135}"/>
               </a:ext>
             </a:extLst>
           </p:cNvPr>
@@ -8343,7 +8344,7 @@
           <p:cNvPr id="77" name="直線矢印コネクタ 76">
             <a:extLst>
               <a:ext uri="{FF2B5EF4-FFF2-40B4-BE49-F238E27FC236}">
-                <a16:creationId xmlns:a16="http://schemas.microsoft.com/office/drawing/2014/main" id="{29751563-FED8-4307-BF39-43FC2A142106}"/>
+                <a16:creationId xmlns:a16="http://schemas.microsoft.com/office/drawing/2014/main" xmlns="" id="{29751563-FED8-4307-BF39-43FC2A142106}"/>
               </a:ext>
             </a:extLst>
           </p:cNvPr>
@@ -8384,7 +8385,7 @@
           <p:cNvPr id="79" name="テキスト ボックス 78">
             <a:extLst>
               <a:ext uri="{FF2B5EF4-FFF2-40B4-BE49-F238E27FC236}">
-                <a16:creationId xmlns:a16="http://schemas.microsoft.com/office/drawing/2014/main" id="{50DEA104-F7DB-4D4D-A228-275022F6BE7F}"/>
+                <a16:creationId xmlns:a16="http://schemas.microsoft.com/office/drawing/2014/main" xmlns="" id="{50DEA104-F7DB-4D4D-A228-275022F6BE7F}"/>
               </a:ext>
             </a:extLst>
           </p:cNvPr>
@@ -8448,7 +8449,7 @@
           <p:cNvPr id="80" name="テキスト ボックス 79">
             <a:extLst>
               <a:ext uri="{FF2B5EF4-FFF2-40B4-BE49-F238E27FC236}">
-                <a16:creationId xmlns:a16="http://schemas.microsoft.com/office/drawing/2014/main" id="{C5B25068-E77A-42B6-A370-001B82DE10AC}"/>
+                <a16:creationId xmlns:a16="http://schemas.microsoft.com/office/drawing/2014/main" xmlns="" id="{C5B25068-E77A-42B6-A370-001B82DE10AC}"/>
               </a:ext>
             </a:extLst>
           </p:cNvPr>
@@ -8497,7 +8498,7 @@
           <p:cNvPr id="82" name="テキスト ボックス 81">
             <a:extLst>
               <a:ext uri="{FF2B5EF4-FFF2-40B4-BE49-F238E27FC236}">
-                <a16:creationId xmlns:a16="http://schemas.microsoft.com/office/drawing/2014/main" id="{6E2F0E77-5E14-42DE-9BC0-877790C16164}"/>
+                <a16:creationId xmlns:a16="http://schemas.microsoft.com/office/drawing/2014/main" xmlns="" id="{6E2F0E77-5E14-42DE-9BC0-877790C16164}"/>
               </a:ext>
             </a:extLst>
           </p:cNvPr>
@@ -8570,7 +8571,7 @@
           <p:cNvPr id="2" name="タイトル 1">
             <a:extLst>
               <a:ext uri="{FF2B5EF4-FFF2-40B4-BE49-F238E27FC236}">
-                <a16:creationId xmlns:a16="http://schemas.microsoft.com/office/drawing/2014/main" id="{860E2CD4-59E9-46A8-8719-8E3A02D3A9F4}"/>
+                <a16:creationId xmlns:a16="http://schemas.microsoft.com/office/drawing/2014/main" xmlns="" id="{860E2CD4-59E9-46A8-8719-8E3A02D3A9F4}"/>
               </a:ext>
             </a:extLst>
           </p:cNvPr>
@@ -8598,7 +8599,7 @@
           <p:cNvPr id="3" name="コンテンツ プレースホルダー 2">
             <a:extLst>
               <a:ext uri="{FF2B5EF4-FFF2-40B4-BE49-F238E27FC236}">
-                <a16:creationId xmlns:a16="http://schemas.microsoft.com/office/drawing/2014/main" id="{2DE15E98-96D3-4BA6-96DE-100A0C898C35}"/>
+                <a16:creationId xmlns:a16="http://schemas.microsoft.com/office/drawing/2014/main" xmlns="" id="{2DE15E98-96D3-4BA6-96DE-100A0C898C35}"/>
               </a:ext>
             </a:extLst>
           </p:cNvPr>
@@ -8636,7 +8637,7 @@
           <p:cNvPr id="4" name="スライド番号プレースホルダー 3">
             <a:extLst>
               <a:ext uri="{FF2B5EF4-FFF2-40B4-BE49-F238E27FC236}">
-                <a16:creationId xmlns:a16="http://schemas.microsoft.com/office/drawing/2014/main" id="{44964B83-6B87-4341-BB18-D3F27CE9813E}"/>
+                <a16:creationId xmlns:a16="http://schemas.microsoft.com/office/drawing/2014/main" xmlns="" id="{44964B83-6B87-4341-BB18-D3F27CE9813E}"/>
               </a:ext>
             </a:extLst>
           </p:cNvPr>
@@ -8666,7 +8667,7 @@
           <p:cNvPr id="8" name="直線コネクタ 7">
             <a:extLst>
               <a:ext uri="{FF2B5EF4-FFF2-40B4-BE49-F238E27FC236}">
-                <a16:creationId xmlns:a16="http://schemas.microsoft.com/office/drawing/2014/main" id="{2CEB2881-D787-4BB1-9F5E-29EF926FD441}"/>
+                <a16:creationId xmlns:a16="http://schemas.microsoft.com/office/drawing/2014/main" xmlns="" id="{2CEB2881-D787-4BB1-9F5E-29EF926FD441}"/>
               </a:ext>
             </a:extLst>
           </p:cNvPr>
@@ -8704,7 +8705,7 @@
           <p:cNvPr id="9" name="Picture 4" descr="「いらすとや スマホ」の画像検索結果">
             <a:extLst>
               <a:ext uri="{FF2B5EF4-FFF2-40B4-BE49-F238E27FC236}">
-                <a16:creationId xmlns:a16="http://schemas.microsoft.com/office/drawing/2014/main" id="{938AEEBA-A6FB-4E91-942C-20C5F7440162}"/>
+                <a16:creationId xmlns:a16="http://schemas.microsoft.com/office/drawing/2014/main" xmlns="" id="{938AEEBA-A6FB-4E91-942C-20C5F7440162}"/>
               </a:ext>
             </a:extLst>
           </p:cNvPr>
@@ -8751,7 +8752,7 @@
           <p:cNvPr id="10" name="Picture 6" descr="http://3.bp.blogspot.com/-C9l4jn_oClE/U3WdDn9_XvI/AAAAAAAAgmE/O03V3A-iHLo/s800/asagao_hachiue.png">
             <a:extLst>
               <a:ext uri="{FF2B5EF4-FFF2-40B4-BE49-F238E27FC236}">
-                <a16:creationId xmlns:a16="http://schemas.microsoft.com/office/drawing/2014/main" id="{2925FB84-7A13-4281-8E06-E3D1D434E249}"/>
+                <a16:creationId xmlns:a16="http://schemas.microsoft.com/office/drawing/2014/main" xmlns="" id="{2925FB84-7A13-4281-8E06-E3D1D434E249}"/>
               </a:ext>
             </a:extLst>
           </p:cNvPr>
@@ -8798,7 +8799,7 @@
           <p:cNvPr id="4098" name="Picture 2" descr="https://www.raspberrypi.org/app/uploads/2015/01/Pi2ModB1GB_-comp.jpeg">
             <a:extLst>
               <a:ext uri="{FF2B5EF4-FFF2-40B4-BE49-F238E27FC236}">
-                <a16:creationId xmlns:a16="http://schemas.microsoft.com/office/drawing/2014/main" id="{1252778F-DECE-41D2-9A78-F4D7CC3CA84A}"/>
+                <a16:creationId xmlns:a16="http://schemas.microsoft.com/office/drawing/2014/main" xmlns="" id="{1252778F-DECE-41D2-9A78-F4D7CC3CA84A}"/>
               </a:ext>
             </a:extLst>
           </p:cNvPr>
@@ -8855,7 +8856,7 @@
           <p:cNvPr id="14" name="直方体 13">
             <a:extLst>
               <a:ext uri="{FF2B5EF4-FFF2-40B4-BE49-F238E27FC236}">
-                <a16:creationId xmlns:a16="http://schemas.microsoft.com/office/drawing/2014/main" id="{F6ADE350-8755-4594-BECE-E52B00B0E0E2}"/>
+                <a16:creationId xmlns:a16="http://schemas.microsoft.com/office/drawing/2014/main" xmlns="" id="{F6ADE350-8755-4594-BECE-E52B00B0E0E2}"/>
               </a:ext>
             </a:extLst>
           </p:cNvPr>
@@ -8901,7 +8902,7 @@
           <p:cNvPr id="15" name="正方形/長方形 14">
             <a:extLst>
               <a:ext uri="{FF2B5EF4-FFF2-40B4-BE49-F238E27FC236}">
-                <a16:creationId xmlns:a16="http://schemas.microsoft.com/office/drawing/2014/main" id="{6A13E490-834C-4CC3-B16A-C68A88AF0F65}"/>
+                <a16:creationId xmlns:a16="http://schemas.microsoft.com/office/drawing/2014/main" xmlns="" id="{6A13E490-834C-4CC3-B16A-C68A88AF0F65}"/>
               </a:ext>
             </a:extLst>
           </p:cNvPr>
@@ -8947,7 +8948,7 @@
           <p:cNvPr id="16" name="楕円 15">
             <a:extLst>
               <a:ext uri="{FF2B5EF4-FFF2-40B4-BE49-F238E27FC236}">
-                <a16:creationId xmlns:a16="http://schemas.microsoft.com/office/drawing/2014/main" id="{0314739D-1571-43F3-9C9D-0816E961342B}"/>
+                <a16:creationId xmlns:a16="http://schemas.microsoft.com/office/drawing/2014/main" xmlns="" id="{0314739D-1571-43F3-9C9D-0816E961342B}"/>
               </a:ext>
             </a:extLst>
           </p:cNvPr>
@@ -8993,7 +8994,7 @@
           <p:cNvPr id="17" name="正方形/長方形 16">
             <a:extLst>
               <a:ext uri="{FF2B5EF4-FFF2-40B4-BE49-F238E27FC236}">
-                <a16:creationId xmlns:a16="http://schemas.microsoft.com/office/drawing/2014/main" id="{41D547A0-BCD7-4816-9113-6FBFDA6A46A8}"/>
+                <a16:creationId xmlns:a16="http://schemas.microsoft.com/office/drawing/2014/main" xmlns="" id="{41D547A0-BCD7-4816-9113-6FBFDA6A46A8}"/>
               </a:ext>
             </a:extLst>
           </p:cNvPr>
@@ -9039,7 +9040,7 @@
           <p:cNvPr id="4100" name="Picture 4" descr="https://t10.pimg.jp/008/563/010/1/8563010.jpg">
             <a:extLst>
               <a:ext uri="{FF2B5EF4-FFF2-40B4-BE49-F238E27FC236}">
-                <a16:creationId xmlns:a16="http://schemas.microsoft.com/office/drawing/2014/main" id="{42948E14-60B7-49E6-9926-A9840ADCAB55}"/>
+                <a16:creationId xmlns:a16="http://schemas.microsoft.com/office/drawing/2014/main" xmlns="" id="{42948E14-60B7-49E6-9926-A9840ADCAB55}"/>
               </a:ext>
             </a:extLst>
           </p:cNvPr>
@@ -9094,7 +9095,7 @@
           <p:cNvPr id="20" name="正方形/長方形 19">
             <a:extLst>
               <a:ext uri="{FF2B5EF4-FFF2-40B4-BE49-F238E27FC236}">
-                <a16:creationId xmlns:a16="http://schemas.microsoft.com/office/drawing/2014/main" id="{D066B5E1-72DE-4720-A112-C4FA1FB04EA1}"/>
+                <a16:creationId xmlns:a16="http://schemas.microsoft.com/office/drawing/2014/main" xmlns="" id="{D066B5E1-72DE-4720-A112-C4FA1FB04EA1}"/>
               </a:ext>
             </a:extLst>
           </p:cNvPr>
@@ -9140,7 +9141,7 @@
           <p:cNvPr id="21" name="楕円 20">
             <a:extLst>
               <a:ext uri="{FF2B5EF4-FFF2-40B4-BE49-F238E27FC236}">
-                <a16:creationId xmlns:a16="http://schemas.microsoft.com/office/drawing/2014/main" id="{10F7665F-9882-4DBF-9021-C59E18BFB33C}"/>
+                <a16:creationId xmlns:a16="http://schemas.microsoft.com/office/drawing/2014/main" xmlns="" id="{10F7665F-9882-4DBF-9021-C59E18BFB33C}"/>
               </a:ext>
             </a:extLst>
           </p:cNvPr>
@@ -9186,7 +9187,7 @@
           <p:cNvPr id="22" name="正方形/長方形 21">
             <a:extLst>
               <a:ext uri="{FF2B5EF4-FFF2-40B4-BE49-F238E27FC236}">
-                <a16:creationId xmlns:a16="http://schemas.microsoft.com/office/drawing/2014/main" id="{4FF9622D-9286-4806-B60D-0F287CC0448D}"/>
+                <a16:creationId xmlns:a16="http://schemas.microsoft.com/office/drawing/2014/main" xmlns="" id="{4FF9622D-9286-4806-B60D-0F287CC0448D}"/>
               </a:ext>
             </a:extLst>
           </p:cNvPr>
@@ -9232,7 +9233,7 @@
           <p:cNvPr id="23" name="Picture 4" descr="https://t10.pimg.jp/008/563/010/1/8563010.jpg">
             <a:extLst>
               <a:ext uri="{FF2B5EF4-FFF2-40B4-BE49-F238E27FC236}">
-                <a16:creationId xmlns:a16="http://schemas.microsoft.com/office/drawing/2014/main" id="{C2A0EBE6-AFE4-45ED-ADAD-601E15C88804}"/>
+                <a16:creationId xmlns:a16="http://schemas.microsoft.com/office/drawing/2014/main" xmlns="" id="{C2A0EBE6-AFE4-45ED-ADAD-601E15C88804}"/>
               </a:ext>
             </a:extLst>
           </p:cNvPr>
@@ -9287,7 +9288,7 @@
           <p:cNvPr id="24" name="直線コネクタ 23">
             <a:extLst>
               <a:ext uri="{FF2B5EF4-FFF2-40B4-BE49-F238E27FC236}">
-                <a16:creationId xmlns:a16="http://schemas.microsoft.com/office/drawing/2014/main" id="{457C539C-0686-4FDA-AC42-EFFFD69C3A75}"/>
+                <a16:creationId xmlns:a16="http://schemas.microsoft.com/office/drawing/2014/main" xmlns="" id="{457C539C-0686-4FDA-AC42-EFFFD69C3A75}"/>
               </a:ext>
             </a:extLst>
           </p:cNvPr>
@@ -9325,7 +9326,7 @@
           <p:cNvPr id="25" name="直線矢印コネクタ 24">
             <a:extLst>
               <a:ext uri="{FF2B5EF4-FFF2-40B4-BE49-F238E27FC236}">
-                <a16:creationId xmlns:a16="http://schemas.microsoft.com/office/drawing/2014/main" id="{4A94BA60-BBBF-42ED-BE43-9F8DC105CBA6}"/>
+                <a16:creationId xmlns:a16="http://schemas.microsoft.com/office/drawing/2014/main" xmlns="" id="{4A94BA60-BBBF-42ED-BE43-9F8DC105CBA6}"/>
               </a:ext>
             </a:extLst>
           </p:cNvPr>
@@ -9373,7 +9374,7 @@
           <p:cNvPr id="27" name="テキスト ボックス 26">
             <a:extLst>
               <a:ext uri="{FF2B5EF4-FFF2-40B4-BE49-F238E27FC236}">
-                <a16:creationId xmlns:a16="http://schemas.microsoft.com/office/drawing/2014/main" id="{024BB50B-6C61-4785-9F2B-ADE237A59040}"/>
+                <a16:creationId xmlns:a16="http://schemas.microsoft.com/office/drawing/2014/main" xmlns="" id="{024BB50B-6C61-4785-9F2B-ADE237A59040}"/>
               </a:ext>
             </a:extLst>
           </p:cNvPr>
@@ -9408,7 +9409,7 @@
           <p:cNvPr id="30" name="テキスト ボックス 29">
             <a:extLst>
               <a:ext uri="{FF2B5EF4-FFF2-40B4-BE49-F238E27FC236}">
-                <a16:creationId xmlns:a16="http://schemas.microsoft.com/office/drawing/2014/main" id="{B1B2012A-CDA4-45B5-B201-A3B7141622E2}"/>
+                <a16:creationId xmlns:a16="http://schemas.microsoft.com/office/drawing/2014/main" xmlns="" id="{B1B2012A-CDA4-45B5-B201-A3B7141622E2}"/>
               </a:ext>
             </a:extLst>
           </p:cNvPr>
@@ -9444,7 +9445,7 @@
           <p:cNvPr id="31" name="テキスト ボックス 30">
             <a:extLst>
               <a:ext uri="{FF2B5EF4-FFF2-40B4-BE49-F238E27FC236}">
-                <a16:creationId xmlns:a16="http://schemas.microsoft.com/office/drawing/2014/main" id="{0761DFFB-7CBF-4D59-8572-29F078D50801}"/>
+                <a16:creationId xmlns:a16="http://schemas.microsoft.com/office/drawing/2014/main" xmlns="" id="{0761DFFB-7CBF-4D59-8572-29F078D50801}"/>
               </a:ext>
             </a:extLst>
           </p:cNvPr>
@@ -9505,15 +9506,245 @@
           <a:chExt cx="0" cy="0"/>
         </a:xfrm>
       </p:grpSpPr>
-      <p:sp>
-        <p:nvSpPr>
-          <p:cNvPr id="2" name="タイトル 1">
-            <a:extLst>
-              <a:ext uri="{FF2B5EF4-FFF2-40B4-BE49-F238E27FC236}">
-                <a16:creationId xmlns:a16="http://schemas.microsoft.com/office/drawing/2014/main" id="{4EB19A9A-0F77-4650-A877-51665E1BD79C}"/>
-              </a:ext>
-            </a:extLst>
-          </p:cNvPr>
+      <p:grpSp>
+        <p:nvGrpSpPr>
+          <p:cNvPr id="15" name="図形グループ 14"/>
+          <p:cNvGrpSpPr/>
+          <p:nvPr/>
+        </p:nvGrpSpPr>
+        <p:grpSpPr>
+          <a:xfrm>
+            <a:off x="3544871" y="2341489"/>
+            <a:ext cx="2749826" cy="2972087"/>
+            <a:chOff x="4452528" y="2909853"/>
+            <a:chExt cx="2749826" cy="2972087"/>
+          </a:xfrm>
+        </p:grpSpPr>
+        <p:pic>
+          <p:nvPicPr>
+            <p:cNvPr id="16" name="図 15"/>
+            <p:cNvPicPr>
+              <a:picLocks noChangeAspect="1"/>
+            </p:cNvPicPr>
+            <p:nvPr/>
+          </p:nvPicPr>
+          <p:blipFill>
+            <a:blip r:embed="rId2">
+              <a:clrChange>
+                <a:clrFrom>
+                  <a:srgbClr val="FFFFFF"/>
+                </a:clrFrom>
+                <a:clrTo>
+                  <a:srgbClr val="FFFFFF">
+                    <a:alpha val="0"/>
+                  </a:srgbClr>
+                </a:clrTo>
+              </a:clrChange>
+            </a:blip>
+            <a:stretch>
+              <a:fillRect/>
+            </a:stretch>
+          </p:blipFill>
+          <p:spPr>
+            <a:xfrm flipH="1">
+              <a:off x="4452528" y="2909853"/>
+              <a:ext cx="2749826" cy="2972087"/>
+            </a:xfrm>
+            <a:prstGeom prst="rect">
+              <a:avLst/>
+            </a:prstGeom>
+          </p:spPr>
+        </p:pic>
+        <p:sp>
+          <p:nvSpPr>
+            <p:cNvPr id="17" name="直方体 16"/>
+            <p:cNvSpPr/>
+            <p:nvPr/>
+          </p:nvSpPr>
+          <p:spPr>
+            <a:xfrm flipH="1">
+              <a:off x="5025942" y="3827533"/>
+              <a:ext cx="337494" cy="576469"/>
+            </a:xfrm>
+            <a:prstGeom prst="cube">
+              <a:avLst>
+                <a:gd name="adj" fmla="val 27945"/>
+              </a:avLst>
+            </a:prstGeom>
+          </p:spPr>
+          <p:style>
+            <a:lnRef idx="2">
+              <a:schemeClr val="accent1">
+                <a:shade val="50000"/>
+              </a:schemeClr>
+            </a:lnRef>
+            <a:fillRef idx="1">
+              <a:schemeClr val="accent1"/>
+            </a:fillRef>
+            <a:effectRef idx="0">
+              <a:schemeClr val="accent1"/>
+            </a:effectRef>
+            <a:fontRef idx="minor">
+              <a:schemeClr val="lt1"/>
+            </a:fontRef>
+          </p:style>
+          <p:txBody>
+            <a:bodyPr rtlCol="0" anchor="ctr"/>
+            <a:lstStyle/>
+            <a:p>
+              <a:pPr algn="ctr"/>
+              <a:endParaRPr kumimoji="1" lang="ja-JP" altLang="en-US"/>
+            </a:p>
+          </p:txBody>
+        </p:sp>
+        <p:sp>
+          <p:nvSpPr>
+            <p:cNvPr id="18" name="フローチャート: 端子 17"/>
+            <p:cNvSpPr/>
+            <p:nvPr/>
+          </p:nvSpPr>
+          <p:spPr>
+            <a:xfrm rot="5400000">
+              <a:off x="4906237" y="4061101"/>
+              <a:ext cx="690987" cy="134180"/>
+            </a:xfrm>
+            <a:prstGeom prst="flowChartTerminator">
+              <a:avLst/>
+            </a:prstGeom>
+            <a:solidFill>
+              <a:schemeClr val="bg1"/>
+            </a:solidFill>
+            <a:ln>
+              <a:solidFill>
+                <a:schemeClr val="tx1">
+                  <a:lumMod val="75000"/>
+                </a:schemeClr>
+              </a:solidFill>
+            </a:ln>
+          </p:spPr>
+          <p:style>
+            <a:lnRef idx="2">
+              <a:schemeClr val="accent1">
+                <a:shade val="50000"/>
+              </a:schemeClr>
+            </a:lnRef>
+            <a:fillRef idx="1">
+              <a:schemeClr val="accent1"/>
+            </a:fillRef>
+            <a:effectRef idx="0">
+              <a:schemeClr val="accent1"/>
+            </a:effectRef>
+            <a:fontRef idx="minor">
+              <a:schemeClr val="lt1"/>
+            </a:fontRef>
+          </p:style>
+          <p:txBody>
+            <a:bodyPr rtlCol="0" anchor="ctr"/>
+            <a:lstStyle/>
+            <a:p>
+              <a:pPr algn="ctr"/>
+              <a:endParaRPr kumimoji="1" lang="ja-JP" altLang="en-US"/>
+            </a:p>
+          </p:txBody>
+        </p:sp>
+        <p:sp>
+          <p:nvSpPr>
+            <p:cNvPr id="19" name="円/楕円 18"/>
+            <p:cNvSpPr/>
+            <p:nvPr/>
+          </p:nvSpPr>
+          <p:spPr>
+            <a:xfrm>
+              <a:off x="5213270" y="4090545"/>
+              <a:ext cx="76919" cy="75292"/>
+            </a:xfrm>
+            <a:prstGeom prst="ellipse">
+              <a:avLst/>
+            </a:prstGeom>
+          </p:spPr>
+          <p:style>
+            <a:lnRef idx="2">
+              <a:schemeClr val="dk1">
+                <a:shade val="50000"/>
+              </a:schemeClr>
+            </a:lnRef>
+            <a:fillRef idx="1">
+              <a:schemeClr val="dk1"/>
+            </a:fillRef>
+            <a:effectRef idx="0">
+              <a:schemeClr val="dk1"/>
+            </a:effectRef>
+            <a:fontRef idx="minor">
+              <a:schemeClr val="lt1"/>
+            </a:fontRef>
+          </p:style>
+          <p:txBody>
+            <a:bodyPr rtlCol="0" anchor="ctr"/>
+            <a:lstStyle/>
+            <a:p>
+              <a:pPr algn="ctr"/>
+              <a:endParaRPr kumimoji="1" lang="ja-JP" altLang="en-US"/>
+            </a:p>
+          </p:txBody>
+        </p:sp>
+        <p:sp>
+          <p:nvSpPr>
+            <p:cNvPr id="20" name="正方形/長方形 19"/>
+            <p:cNvSpPr/>
+            <p:nvPr/>
+          </p:nvSpPr>
+          <p:spPr>
+            <a:xfrm>
+              <a:off x="5251729" y="3827533"/>
+              <a:ext cx="1157163" cy="97104"/>
+            </a:xfrm>
+            <a:prstGeom prst="rect">
+              <a:avLst/>
+            </a:prstGeom>
+            <a:solidFill>
+              <a:schemeClr val="tx1">
+                <a:lumMod val="40000"/>
+                <a:lumOff val="60000"/>
+                <a:alpha val="84000"/>
+              </a:schemeClr>
+            </a:solidFill>
+            <a:ln>
+              <a:solidFill>
+                <a:schemeClr val="tx1">
+                  <a:lumMod val="75000"/>
+                </a:schemeClr>
+              </a:solidFill>
+            </a:ln>
+          </p:spPr>
+          <p:style>
+            <a:lnRef idx="2">
+              <a:schemeClr val="accent1">
+                <a:shade val="50000"/>
+              </a:schemeClr>
+            </a:lnRef>
+            <a:fillRef idx="1">
+              <a:schemeClr val="accent1"/>
+            </a:fillRef>
+            <a:effectRef idx="0">
+              <a:schemeClr val="accent1"/>
+            </a:effectRef>
+            <a:fontRef idx="minor">
+              <a:schemeClr val="lt1"/>
+            </a:fontRef>
+          </p:style>
+          <p:txBody>
+            <a:bodyPr rtlCol="0" anchor="ctr"/>
+            <a:lstStyle/>
+            <a:p>
+              <a:pPr algn="ctr"/>
+              <a:endParaRPr kumimoji="1" lang="ja-JP" altLang="en-US"/>
+            </a:p>
+          </p:txBody>
+        </p:sp>
+      </p:grpSp>
+      <p:sp>
+        <p:nvSpPr>
+          <p:cNvPr id="2" name="タイトル 1"/>
           <p:cNvSpPr>
             <a:spLocks noGrp="1"/>
           </p:cNvSpPr>
@@ -9527,6 +9758,634 @@
           <a:lstStyle/>
           <a:p>
             <a:r>
+              <a:rPr kumimoji="1" lang="ja-JP" altLang="en-US" dirty="0" smtClean="0"/>
+              <a:t>あさがおシステム</a:t>
+            </a:r>
+            <a:endParaRPr kumimoji="1" lang="ja-JP" altLang="en-US" dirty="0"/>
+          </a:p>
+        </p:txBody>
+      </p:sp>
+      <p:sp>
+        <p:nvSpPr>
+          <p:cNvPr id="4" name="スライド番号プレースホルダー 3"/>
+          <p:cNvSpPr>
+            <a:spLocks noGrp="1"/>
+          </p:cNvSpPr>
+          <p:nvPr>
+            <p:ph type="sldNum" sz="quarter" idx="12"/>
+          </p:nvPr>
+        </p:nvSpPr>
+        <p:spPr/>
+        <p:txBody>
+          <a:bodyPr/>
+          <a:lstStyle/>
+          <a:p>
+            <a:fld id="{BF192E9D-17CA-4947-8A69-EE62A836DA25}" type="slidenum">
+              <a:rPr lang="ja-JP" altLang="en-US" smtClean="0"/>
+              <a:pPr/>
+              <a:t>8</a:t>
+            </a:fld>
+            <a:endParaRPr lang="ja-JP" altLang="en-US"/>
+          </a:p>
+        </p:txBody>
+      </p:sp>
+      <p:pic>
+        <p:nvPicPr>
+          <p:cNvPr id="5" name="Picture 6" descr="http://3.bp.blogspot.com/-C9l4jn_oClE/U3WdDn9_XvI/AAAAAAAAgmE/O03V3A-iHLo/s800/asagao_hachiue.png">
+            <a:extLst>
+              <a:ext uri="{FF2B5EF4-FFF2-40B4-BE49-F238E27FC236}">
+                <a16:creationId xmlns:a16="http://schemas.microsoft.com/office/drawing/2014/main" xmlns="" id="{2925FB84-7A13-4281-8E06-E3D1D434E249}"/>
+              </a:ext>
+            </a:extLst>
+          </p:cNvPr>
+          <p:cNvPicPr>
+            <a:picLocks noChangeAspect="1" noChangeArrowheads="1"/>
+          </p:cNvPicPr>
+          <p:nvPr/>
+        </p:nvPicPr>
+        <p:blipFill>
+          <a:blip r:embed="rId3">
+            <a:extLst>
+              <a:ext uri="{28A0092B-C50C-407E-A947-70E740481C1C}">
+                <a14:useLocalDpi xmlns:a14="http://schemas.microsoft.com/office/drawing/2010/main" val="0"/>
+              </a:ext>
+            </a:extLst>
+          </a:blip>
+          <a:srcRect/>
+          <a:stretch>
+            <a:fillRect/>
+          </a:stretch>
+        </p:blipFill>
+        <p:spPr bwMode="auto">
+          <a:xfrm>
+            <a:off x="7251411" y="1881842"/>
+            <a:ext cx="3285265" cy="4000098"/>
+          </a:xfrm>
+          <a:prstGeom prst="rect">
+            <a:avLst/>
+          </a:prstGeom>
+          <a:noFill/>
+          <a:extLst>
+            <a:ext uri="{909E8E84-426E-40DD-AFC4-6F175D3DCCD1}">
+              <a14:hiddenFill xmlns:a14="http://schemas.microsoft.com/office/drawing/2010/main">
+                <a:solidFill>
+                  <a:srgbClr val="FFFFFF"/>
+                </a:solidFill>
+              </a14:hiddenFill>
+            </a:ext>
+          </a:extLst>
+        </p:spPr>
+      </p:pic>
+      <p:grpSp>
+        <p:nvGrpSpPr>
+          <p:cNvPr id="14" name="図形グループ 13"/>
+          <p:cNvGrpSpPr/>
+          <p:nvPr/>
+        </p:nvGrpSpPr>
+        <p:grpSpPr>
+          <a:xfrm>
+            <a:off x="4382532" y="3328246"/>
+            <a:ext cx="2749826" cy="2972087"/>
+            <a:chOff x="4452528" y="2909853"/>
+            <a:chExt cx="2749826" cy="2972087"/>
+          </a:xfrm>
+        </p:grpSpPr>
+        <p:pic>
+          <p:nvPicPr>
+            <p:cNvPr id="7" name="図 6"/>
+            <p:cNvPicPr>
+              <a:picLocks noChangeAspect="1"/>
+            </p:cNvPicPr>
+            <p:nvPr/>
+          </p:nvPicPr>
+          <p:blipFill>
+            <a:blip r:embed="rId2">
+              <a:clrChange>
+                <a:clrFrom>
+                  <a:srgbClr val="FFFFFF"/>
+                </a:clrFrom>
+                <a:clrTo>
+                  <a:srgbClr val="FFFFFF">
+                    <a:alpha val="0"/>
+                  </a:srgbClr>
+                </a:clrTo>
+              </a:clrChange>
+            </a:blip>
+            <a:stretch>
+              <a:fillRect/>
+            </a:stretch>
+          </p:blipFill>
+          <p:spPr>
+            <a:xfrm flipH="1">
+              <a:off x="4452528" y="2909853"/>
+              <a:ext cx="2749826" cy="2972087"/>
+            </a:xfrm>
+            <a:prstGeom prst="rect">
+              <a:avLst/>
+            </a:prstGeom>
+          </p:spPr>
+        </p:pic>
+        <p:sp>
+          <p:nvSpPr>
+            <p:cNvPr id="9" name="直方体 8"/>
+            <p:cNvSpPr/>
+            <p:nvPr/>
+          </p:nvSpPr>
+          <p:spPr>
+            <a:xfrm flipH="1">
+              <a:off x="5025942" y="3827533"/>
+              <a:ext cx="337494" cy="576469"/>
+            </a:xfrm>
+            <a:prstGeom prst="cube">
+              <a:avLst>
+                <a:gd name="adj" fmla="val 27945"/>
+              </a:avLst>
+            </a:prstGeom>
+          </p:spPr>
+          <p:style>
+            <a:lnRef idx="2">
+              <a:schemeClr val="accent1">
+                <a:shade val="50000"/>
+              </a:schemeClr>
+            </a:lnRef>
+            <a:fillRef idx="1">
+              <a:schemeClr val="accent1"/>
+            </a:fillRef>
+            <a:effectRef idx="0">
+              <a:schemeClr val="accent1"/>
+            </a:effectRef>
+            <a:fontRef idx="minor">
+              <a:schemeClr val="lt1"/>
+            </a:fontRef>
+          </p:style>
+          <p:txBody>
+            <a:bodyPr rtlCol="0" anchor="ctr"/>
+            <a:lstStyle/>
+            <a:p>
+              <a:pPr algn="ctr"/>
+              <a:endParaRPr kumimoji="1" lang="ja-JP" altLang="en-US"/>
+            </a:p>
+          </p:txBody>
+        </p:sp>
+        <p:sp>
+          <p:nvSpPr>
+            <p:cNvPr id="10" name="フローチャート: 端子 9"/>
+            <p:cNvSpPr/>
+            <p:nvPr/>
+          </p:nvSpPr>
+          <p:spPr>
+            <a:xfrm rot="5400000">
+              <a:off x="4906237" y="4061101"/>
+              <a:ext cx="690987" cy="134180"/>
+            </a:xfrm>
+            <a:prstGeom prst="flowChartTerminator">
+              <a:avLst/>
+            </a:prstGeom>
+            <a:solidFill>
+              <a:schemeClr val="bg1"/>
+            </a:solidFill>
+            <a:ln>
+              <a:solidFill>
+                <a:schemeClr val="tx1">
+                  <a:lumMod val="75000"/>
+                </a:schemeClr>
+              </a:solidFill>
+            </a:ln>
+          </p:spPr>
+          <p:style>
+            <a:lnRef idx="2">
+              <a:schemeClr val="accent1">
+                <a:shade val="50000"/>
+              </a:schemeClr>
+            </a:lnRef>
+            <a:fillRef idx="1">
+              <a:schemeClr val="accent1"/>
+            </a:fillRef>
+            <a:effectRef idx="0">
+              <a:schemeClr val="accent1"/>
+            </a:effectRef>
+            <a:fontRef idx="minor">
+              <a:schemeClr val="lt1"/>
+            </a:fontRef>
+          </p:style>
+          <p:txBody>
+            <a:bodyPr rtlCol="0" anchor="ctr"/>
+            <a:lstStyle/>
+            <a:p>
+              <a:pPr algn="ctr"/>
+              <a:endParaRPr kumimoji="1" lang="ja-JP" altLang="en-US"/>
+            </a:p>
+          </p:txBody>
+        </p:sp>
+        <p:sp>
+          <p:nvSpPr>
+            <p:cNvPr id="11" name="円/楕円 10"/>
+            <p:cNvSpPr/>
+            <p:nvPr/>
+          </p:nvSpPr>
+          <p:spPr>
+            <a:xfrm>
+              <a:off x="5213270" y="4090545"/>
+              <a:ext cx="76919" cy="75292"/>
+            </a:xfrm>
+            <a:prstGeom prst="ellipse">
+              <a:avLst/>
+            </a:prstGeom>
+          </p:spPr>
+          <p:style>
+            <a:lnRef idx="2">
+              <a:schemeClr val="dk1">
+                <a:shade val="50000"/>
+              </a:schemeClr>
+            </a:lnRef>
+            <a:fillRef idx="1">
+              <a:schemeClr val="dk1"/>
+            </a:fillRef>
+            <a:effectRef idx="0">
+              <a:schemeClr val="dk1"/>
+            </a:effectRef>
+            <a:fontRef idx="minor">
+              <a:schemeClr val="lt1"/>
+            </a:fontRef>
+          </p:style>
+          <p:txBody>
+            <a:bodyPr rtlCol="0" anchor="ctr"/>
+            <a:lstStyle/>
+            <a:p>
+              <a:pPr algn="ctr"/>
+              <a:endParaRPr kumimoji="1" lang="ja-JP" altLang="en-US"/>
+            </a:p>
+          </p:txBody>
+        </p:sp>
+        <p:sp>
+          <p:nvSpPr>
+            <p:cNvPr id="12" name="正方形/長方形 11"/>
+            <p:cNvSpPr/>
+            <p:nvPr/>
+          </p:nvSpPr>
+          <p:spPr>
+            <a:xfrm>
+              <a:off x="5251729" y="3827533"/>
+              <a:ext cx="1157163" cy="97104"/>
+            </a:xfrm>
+            <a:prstGeom prst="rect">
+              <a:avLst/>
+            </a:prstGeom>
+            <a:solidFill>
+              <a:schemeClr val="tx1">
+                <a:lumMod val="40000"/>
+                <a:lumOff val="60000"/>
+                <a:alpha val="84000"/>
+              </a:schemeClr>
+            </a:solidFill>
+            <a:ln>
+              <a:solidFill>
+                <a:schemeClr val="tx1">
+                  <a:lumMod val="75000"/>
+                </a:schemeClr>
+              </a:solidFill>
+            </a:ln>
+          </p:spPr>
+          <p:style>
+            <a:lnRef idx="2">
+              <a:schemeClr val="accent1">
+                <a:shade val="50000"/>
+              </a:schemeClr>
+            </a:lnRef>
+            <a:fillRef idx="1">
+              <a:schemeClr val="accent1"/>
+            </a:fillRef>
+            <a:effectRef idx="0">
+              <a:schemeClr val="accent1"/>
+            </a:effectRef>
+            <a:fontRef idx="minor">
+              <a:schemeClr val="lt1"/>
+            </a:fontRef>
+          </p:style>
+          <p:txBody>
+            <a:bodyPr rtlCol="0" anchor="ctr"/>
+            <a:lstStyle/>
+            <a:p>
+              <a:pPr algn="ctr"/>
+              <a:endParaRPr kumimoji="1" lang="ja-JP" altLang="en-US"/>
+            </a:p>
+          </p:txBody>
+        </p:sp>
+      </p:grpSp>
+      <p:pic>
+        <p:nvPicPr>
+          <p:cNvPr id="13" name="Picture 2" descr="https://www.raspberrypi.org/app/uploads/2015/01/Pi2ModB1GB_-comp.jpeg">
+            <a:extLst>
+              <a:ext uri="{FF2B5EF4-FFF2-40B4-BE49-F238E27FC236}">
+                <a16:creationId xmlns:a16="http://schemas.microsoft.com/office/drawing/2014/main" xmlns="" id="{1252778F-DECE-41D2-9A78-F4D7CC3CA84A}"/>
+              </a:ext>
+            </a:extLst>
+          </p:cNvPr>
+          <p:cNvPicPr>
+            <a:picLocks noChangeAspect="1" noChangeArrowheads="1"/>
+          </p:cNvPicPr>
+          <p:nvPr/>
+        </p:nvPicPr>
+        <p:blipFill>
+          <a:blip r:embed="rId4" cstate="print">
+            <a:clrChange>
+              <a:clrFrom>
+                <a:srgbClr val="FFFFFF"/>
+              </a:clrFrom>
+              <a:clrTo>
+                <a:srgbClr val="FFFFFF">
+                  <a:alpha val="0"/>
+                </a:srgbClr>
+              </a:clrTo>
+            </a:clrChange>
+            <a:extLst>
+              <a:ext uri="{28A0092B-C50C-407E-A947-70E740481C1C}">
+                <a14:useLocalDpi xmlns:a14="http://schemas.microsoft.com/office/drawing/2010/main"/>
+              </a:ext>
+            </a:extLst>
+          </a:blip>
+          <a:srcRect/>
+          <a:stretch>
+            <a:fillRect/>
+          </a:stretch>
+        </p:blipFill>
+        <p:spPr bwMode="auto">
+          <a:xfrm>
+            <a:off x="1965235" y="4624124"/>
+            <a:ext cx="2224767" cy="1260954"/>
+          </a:xfrm>
+          <a:prstGeom prst="rect">
+            <a:avLst/>
+          </a:prstGeom>
+          <a:noFill/>
+          <a:extLst>
+            <a:ext uri="{909E8E84-426E-40DD-AFC4-6F175D3DCCD1}">
+              <a14:hiddenFill xmlns:a14="http://schemas.microsoft.com/office/drawing/2010/main">
+                <a:solidFill>
+                  <a:srgbClr val="FFFFFF"/>
+                </a:solidFill>
+              </a14:hiddenFill>
+            </a:ext>
+          </a:extLst>
+        </p:spPr>
+      </p:pic>
+      <p:cxnSp>
+        <p:nvCxnSpPr>
+          <p:cNvPr id="22" name="直線コネクタ 21"/>
+          <p:cNvCxnSpPr>
+            <a:stCxn id="17" idx="5"/>
+          </p:cNvCxnSpPr>
+          <p:nvPr/>
+        </p:nvCxnSpPr>
+        <p:spPr>
+          <a:xfrm flipH="1">
+            <a:off x="2983442" y="3500247"/>
+            <a:ext cx="1134843" cy="1253071"/>
+          </a:xfrm>
+          <a:prstGeom prst="line">
+            <a:avLst/>
+          </a:prstGeom>
+        </p:spPr>
+        <p:style>
+          <a:lnRef idx="1">
+            <a:schemeClr val="accent1"/>
+          </a:lnRef>
+          <a:fillRef idx="0">
+            <a:schemeClr val="accent1"/>
+          </a:fillRef>
+          <a:effectRef idx="0">
+            <a:schemeClr val="accent1"/>
+          </a:effectRef>
+          <a:fontRef idx="minor">
+            <a:schemeClr val="tx1"/>
+          </a:fontRef>
+        </p:style>
+      </p:cxnSp>
+      <p:cxnSp>
+        <p:nvCxnSpPr>
+          <p:cNvPr id="23" name="直線コネクタ 22"/>
+          <p:cNvCxnSpPr>
+            <a:stCxn id="9" idx="5"/>
+          </p:cNvCxnSpPr>
+          <p:nvPr/>
+        </p:nvCxnSpPr>
+        <p:spPr>
+          <a:xfrm flipH="1">
+            <a:off x="3135843" y="4487004"/>
+            <a:ext cx="1820103" cy="418714"/>
+          </a:xfrm>
+          <a:prstGeom prst="line">
+            <a:avLst/>
+          </a:prstGeom>
+        </p:spPr>
+        <p:style>
+          <a:lnRef idx="1">
+            <a:schemeClr val="accent1"/>
+          </a:lnRef>
+          <a:fillRef idx="0">
+            <a:schemeClr val="accent1"/>
+          </a:fillRef>
+          <a:effectRef idx="0">
+            <a:schemeClr val="accent1"/>
+          </a:effectRef>
+          <a:fontRef idx="minor">
+            <a:schemeClr val="tx1"/>
+          </a:fontRef>
+        </p:style>
+      </p:cxnSp>
+      <p:cxnSp>
+        <p:nvCxnSpPr>
+          <p:cNvPr id="26" name="直線矢印コネクタ 25"/>
+          <p:cNvCxnSpPr/>
+          <p:nvPr/>
+        </p:nvCxnSpPr>
+        <p:spPr>
+          <a:xfrm>
+            <a:off x="3293458" y="2613727"/>
+            <a:ext cx="752436" cy="600606"/>
+          </a:xfrm>
+          <a:prstGeom prst="straightConnector1">
+            <a:avLst/>
+          </a:prstGeom>
+          <a:ln>
+            <a:tailEnd type="triangle"/>
+          </a:ln>
+        </p:spPr>
+        <p:style>
+          <a:lnRef idx="1">
+            <a:schemeClr val="accent1"/>
+          </a:lnRef>
+          <a:fillRef idx="0">
+            <a:schemeClr val="accent1"/>
+          </a:fillRef>
+          <a:effectRef idx="0">
+            <a:schemeClr val="accent1"/>
+          </a:effectRef>
+          <a:fontRef idx="minor">
+            <a:schemeClr val="tx1"/>
+          </a:fontRef>
+        </p:style>
+      </p:cxnSp>
+      <p:sp>
+        <p:nvSpPr>
+          <p:cNvPr id="27" name="テキスト ボックス 26"/>
+          <p:cNvSpPr txBox="1"/>
+          <p:nvPr/>
+        </p:nvSpPr>
+        <p:spPr>
+          <a:xfrm>
+            <a:off x="2039112" y="2214598"/>
+            <a:ext cx="1888659" cy="307777"/>
+          </a:xfrm>
+          <a:prstGeom prst="rect">
+            <a:avLst/>
+          </a:prstGeom>
+          <a:noFill/>
+        </p:spPr>
+        <p:txBody>
+          <a:bodyPr wrap="none" rtlCol="0">
+            <a:spAutoFit/>
+          </a:bodyPr>
+          <a:lstStyle/>
+          <a:p>
+            <a:r>
+              <a:rPr kumimoji="1" lang="ja-JP" altLang="en-US" sz="1400" dirty="0" smtClean="0"/>
+              <a:t>サーボモーター</a:t>
+            </a:r>
+            <a:r>
+              <a:rPr kumimoji="1" lang="en-US" altLang="ja-JP" sz="1400" dirty="0" smtClean="0"/>
+              <a:t>(sg90)</a:t>
+            </a:r>
+            <a:endParaRPr kumimoji="1" lang="ja-JP" altLang="en-US" sz="1400" dirty="0"/>
+          </a:p>
+        </p:txBody>
+      </p:sp>
+      <p:sp>
+        <p:nvSpPr>
+          <p:cNvPr id="28" name="テキスト ボックス 27"/>
+          <p:cNvSpPr txBox="1"/>
+          <p:nvPr/>
+        </p:nvSpPr>
+        <p:spPr>
+          <a:xfrm>
+            <a:off x="5156155" y="1635053"/>
+            <a:ext cx="2877711" cy="523220"/>
+          </a:xfrm>
+          <a:prstGeom prst="rect">
+            <a:avLst/>
+          </a:prstGeom>
+          <a:noFill/>
+        </p:spPr>
+        <p:txBody>
+          <a:bodyPr wrap="none" rtlCol="0">
+            <a:spAutoFit/>
+          </a:bodyPr>
+          <a:lstStyle/>
+          <a:p>
+            <a:r>
+              <a:rPr kumimoji="1" lang="ja-JP" altLang="en-US" sz="1400" dirty="0" smtClean="0"/>
+              <a:t>サーボ</a:t>
+            </a:r>
+            <a:r>
+              <a:rPr lang="ja-JP" altLang="en-US" sz="1400" dirty="0" smtClean="0"/>
+              <a:t>が回転すると引っ張られて</a:t>
+            </a:r>
+            <a:endParaRPr lang="en-US" altLang="ja-JP" sz="1400" dirty="0" smtClean="0"/>
+          </a:p>
+          <a:p>
+            <a:r>
+              <a:rPr kumimoji="1" lang="ja-JP" altLang="en-US" sz="1400" dirty="0" smtClean="0"/>
+              <a:t>スプレーから射出</a:t>
+            </a:r>
+            <a:endParaRPr kumimoji="1" lang="ja-JP" altLang="en-US" sz="1400" dirty="0"/>
+          </a:p>
+        </p:txBody>
+      </p:sp>
+      <p:cxnSp>
+        <p:nvCxnSpPr>
+          <p:cNvPr id="29" name="直線矢印コネクタ 28"/>
+          <p:cNvCxnSpPr/>
+          <p:nvPr/>
+        </p:nvCxnSpPr>
+        <p:spPr>
+          <a:xfrm flipH="1">
+            <a:off x="5551653" y="2214670"/>
+            <a:ext cx="743044" cy="925149"/>
+          </a:xfrm>
+          <a:prstGeom prst="straightConnector1">
+            <a:avLst/>
+          </a:prstGeom>
+          <a:ln>
+            <a:tailEnd type="triangle"/>
+          </a:ln>
+        </p:spPr>
+        <p:style>
+          <a:lnRef idx="1">
+            <a:schemeClr val="accent1"/>
+          </a:lnRef>
+          <a:fillRef idx="0">
+            <a:schemeClr val="accent1"/>
+          </a:fillRef>
+          <a:effectRef idx="0">
+            <a:schemeClr val="accent1"/>
+          </a:effectRef>
+          <a:fontRef idx="minor">
+            <a:schemeClr val="tx1"/>
+          </a:fontRef>
+        </p:style>
+      </p:cxnSp>
+    </p:spTree>
+    <p:extLst>
+      <p:ext uri="{BB962C8B-B14F-4D97-AF65-F5344CB8AC3E}">
+        <p14:creationId xmlns:p14="http://schemas.microsoft.com/office/powerpoint/2010/main" val="1855653551"/>
+      </p:ext>
+    </p:extLst>
+  </p:cSld>
+  <p:clrMapOvr>
+    <a:masterClrMapping/>
+  </p:clrMapOvr>
+</p:sld>
+</file>
+
+<file path=ppt/slides/slide9.xml><?xml version="1.0" encoding="utf-8"?>
+<p:sld xmlns:a="http://schemas.openxmlformats.org/drawingml/2006/main" xmlns:r="http://schemas.openxmlformats.org/officeDocument/2006/relationships" xmlns:p="http://schemas.openxmlformats.org/presentationml/2006/main">
+  <p:cSld>
+    <p:spTree>
+      <p:nvGrpSpPr>
+        <p:cNvPr id="1" name=""/>
+        <p:cNvGrpSpPr/>
+        <p:nvPr/>
+      </p:nvGrpSpPr>
+      <p:grpSpPr>
+        <a:xfrm>
+          <a:off x="0" y="0"/>
+          <a:ext cx="0" cy="0"/>
+          <a:chOff x="0" y="0"/>
+          <a:chExt cx="0" cy="0"/>
+        </a:xfrm>
+      </p:grpSpPr>
+      <p:sp>
+        <p:nvSpPr>
+          <p:cNvPr id="2" name="タイトル 1">
+            <a:extLst>
+              <a:ext uri="{FF2B5EF4-FFF2-40B4-BE49-F238E27FC236}">
+                <a16:creationId xmlns:a16="http://schemas.microsoft.com/office/drawing/2014/main" xmlns="" id="{4EB19A9A-0F77-4650-A877-51665E1BD79C}"/>
+              </a:ext>
+            </a:extLst>
+          </p:cNvPr>
+          <p:cNvSpPr>
+            <a:spLocks noGrp="1"/>
+          </p:cNvSpPr>
+          <p:nvPr>
+            <p:ph type="title"/>
+          </p:nvPr>
+        </p:nvSpPr>
+        <p:spPr/>
+        <p:txBody>
+          <a:bodyPr/>
+          <a:lstStyle/>
+          <a:p>
+            <a:r>
               <a:rPr lang="ja-JP" altLang="en-US" dirty="0"/>
               <a:t>仕様技術</a:t>
             </a:r>
@@ -9539,7 +10398,7 @@
           <p:cNvPr id="3" name="コンテンツ プレースホルダー 2">
             <a:extLst>
               <a:ext uri="{FF2B5EF4-FFF2-40B4-BE49-F238E27FC236}">
-                <a16:creationId xmlns:a16="http://schemas.microsoft.com/office/drawing/2014/main" id="{96370495-3497-4FD7-A614-8A1C7A7A3E90}"/>
+                <a16:creationId xmlns:a16="http://schemas.microsoft.com/office/drawing/2014/main" xmlns="" id="{96370495-3497-4FD7-A614-8A1C7A7A3E90}"/>
               </a:ext>
             </a:extLst>
           </p:cNvPr>
@@ -9643,7 +10502,7 @@
           <p:cNvPr id="4" name="スライド番号プレースホルダー 3">
             <a:extLst>
               <a:ext uri="{FF2B5EF4-FFF2-40B4-BE49-F238E27FC236}">
-                <a16:creationId xmlns:a16="http://schemas.microsoft.com/office/drawing/2014/main" id="{6A58A5D5-53B1-47DD-9F12-D6D7174F8D3E}"/>
+                <a16:creationId xmlns:a16="http://schemas.microsoft.com/office/drawing/2014/main" xmlns="" id="{6A58A5D5-53B1-47DD-9F12-D6D7174F8D3E}"/>
               </a:ext>
             </a:extLst>
           </p:cNvPr>
@@ -9662,7 +10521,7 @@
             <a:fld id="{BF192E9D-17CA-4947-8A69-EE62A836DA25}" type="slidenum">
               <a:rPr lang="ja-JP" altLang="en-US" smtClean="0"/>
               <a:pPr/>
-              <a:t>8</a:t>
+              <a:t>9</a:t>
             </a:fld>
             <a:endParaRPr lang="ja-JP" altLang="en-US"/>
           </a:p>

</xml_diff>